<commit_message>
Blank aps & Updates
</commit_message>
<xml_diff>
--- a/Class 2.pptx
+++ b/Class 2.pptx
@@ -5,30 +5,32 @@
     <p:sldMasterId id="2147483648" r:id="rId1"/>
   </p:sldMasterIdLst>
   <p:notesMasterIdLst>
-    <p:notesMasterId r:id="rId23"/>
+    <p:notesMasterId r:id="rId25"/>
   </p:notesMasterIdLst>
   <p:sldIdLst>
     <p:sldId id="256" r:id="rId2"/>
-    <p:sldId id="267" r:id="rId3"/>
-    <p:sldId id="351" r:id="rId4"/>
-    <p:sldId id="268" r:id="rId5"/>
-    <p:sldId id="261" r:id="rId6"/>
-    <p:sldId id="263" r:id="rId7"/>
-    <p:sldId id="264" r:id="rId8"/>
-    <p:sldId id="265" r:id="rId9"/>
-    <p:sldId id="266" r:id="rId10"/>
-    <p:sldId id="269" r:id="rId11"/>
-    <p:sldId id="270" r:id="rId12"/>
-    <p:sldId id="271" r:id="rId13"/>
-    <p:sldId id="272" r:id="rId14"/>
-    <p:sldId id="371" r:id="rId15"/>
-    <p:sldId id="276" r:id="rId16"/>
-    <p:sldId id="275" r:id="rId17"/>
-    <p:sldId id="277" r:id="rId18"/>
-    <p:sldId id="352" r:id="rId19"/>
-    <p:sldId id="353" r:id="rId20"/>
-    <p:sldId id="354" r:id="rId21"/>
-    <p:sldId id="278" r:id="rId22"/>
+    <p:sldId id="373" r:id="rId3"/>
+    <p:sldId id="372" r:id="rId4"/>
+    <p:sldId id="267" r:id="rId5"/>
+    <p:sldId id="351" r:id="rId6"/>
+    <p:sldId id="268" r:id="rId7"/>
+    <p:sldId id="261" r:id="rId8"/>
+    <p:sldId id="263" r:id="rId9"/>
+    <p:sldId id="264" r:id="rId10"/>
+    <p:sldId id="265" r:id="rId11"/>
+    <p:sldId id="266" r:id="rId12"/>
+    <p:sldId id="269" r:id="rId13"/>
+    <p:sldId id="270" r:id="rId14"/>
+    <p:sldId id="271" r:id="rId15"/>
+    <p:sldId id="272" r:id="rId16"/>
+    <p:sldId id="276" r:id="rId17"/>
+    <p:sldId id="275" r:id="rId18"/>
+    <p:sldId id="277" r:id="rId19"/>
+    <p:sldId id="352" r:id="rId20"/>
+    <p:sldId id="353" r:id="rId21"/>
+    <p:sldId id="354" r:id="rId22"/>
+    <p:sldId id="371" r:id="rId23"/>
+    <p:sldId id="278" r:id="rId24"/>
   </p:sldIdLst>
   <p:sldSz cx="12192000" cy="6858000"/>
   <p:notesSz cx="6858000" cy="9144000"/>
@@ -217,7 +219,7 @@
           <a:p>
             <a:fld id="{77290002-3E2F-024D-989E-7C1D88EB1B81}" type="datetimeFigureOut">
               <a:rPr lang="en-US" smtClean="0"/>
-              <a:t>7/6/18</a:t>
+              <a:t>8/30/18</a:t>
             </a:fld>
             <a:endParaRPr lang="en-US"/>
           </a:p>
@@ -654,7 +656,7 @@
             <a:fld id="{87DE6118-2437-4B30-8E3C-4D2BE6020583}" type="datetimeFigureOut">
               <a:rPr lang="en-US" dirty="0"/>
               <a:pPr/>
-              <a:t>7/6/18</a:t>
+              <a:t>8/30/18</a:t>
             </a:fld>
             <a:endParaRPr lang="en-US" dirty="0"/>
           </a:p>
@@ -980,7 +982,7 @@
           <a:p>
             <a:fld id="{87DE6118-2437-4B30-8E3C-4D2BE6020583}" type="datetimeFigureOut">
               <a:rPr lang="en-US" dirty="0"/>
-              <a:t>7/6/18</a:t>
+              <a:t>8/30/18</a:t>
             </a:fld>
             <a:endParaRPr lang="en-US" dirty="0"/>
           </a:p>
@@ -1155,7 +1157,7 @@
           <a:p>
             <a:fld id="{87DE6118-2437-4B30-8E3C-4D2BE6020583}" type="datetimeFigureOut">
               <a:rPr lang="en-US" dirty="0"/>
-              <a:t>7/6/18</a:t>
+              <a:t>8/30/18</a:t>
             </a:fld>
             <a:endParaRPr lang="en-US" dirty="0"/>
           </a:p>
@@ -1320,7 +1322,7 @@
           <a:p>
             <a:fld id="{87DE6118-2437-4B30-8E3C-4D2BE6020583}" type="datetimeFigureOut">
               <a:rPr lang="en-US" dirty="0"/>
-              <a:t>7/6/18</a:t>
+              <a:t>8/30/18</a:t>
             </a:fld>
             <a:endParaRPr lang="en-US" dirty="0"/>
           </a:p>
@@ -1593,7 +1595,7 @@
             <a:fld id="{87DE6118-2437-4B30-8E3C-4D2BE6020583}" type="datetimeFigureOut">
               <a:rPr lang="en-US" dirty="0"/>
               <a:pPr/>
-              <a:t>7/6/18</a:t>
+              <a:t>8/30/18</a:t>
             </a:fld>
             <a:endParaRPr lang="en-US" dirty="0"/>
           </a:p>
@@ -1983,7 +1985,7 @@
           <a:p>
             <a:fld id="{87DE6118-2437-4B30-8E3C-4D2BE6020583}" type="datetimeFigureOut">
               <a:rPr lang="en-US" dirty="0"/>
-              <a:t>7/6/18</a:t>
+              <a:t>8/30/18</a:t>
             </a:fld>
             <a:endParaRPr lang="en-US" dirty="0"/>
           </a:p>
@@ -2455,7 +2457,7 @@
           <a:p>
             <a:fld id="{87DE6118-2437-4B30-8E3C-4D2BE6020583}" type="datetimeFigureOut">
               <a:rPr lang="en-US" dirty="0"/>
-              <a:t>7/6/18</a:t>
+              <a:t>8/30/18</a:t>
             </a:fld>
             <a:endParaRPr lang="en-US" dirty="0"/>
           </a:p>
@@ -2568,7 +2570,7 @@
           <a:p>
             <a:fld id="{87DE6118-2437-4B30-8E3C-4D2BE6020583}" type="datetimeFigureOut">
               <a:rPr lang="en-US" dirty="0"/>
-              <a:t>7/6/18</a:t>
+              <a:t>8/30/18</a:t>
             </a:fld>
             <a:endParaRPr lang="en-US" dirty="0"/>
           </a:p>
@@ -2658,7 +2660,7 @@
           <a:p>
             <a:fld id="{87DE6118-2437-4B30-8E3C-4D2BE6020583}" type="datetimeFigureOut">
               <a:rPr lang="en-US" dirty="0"/>
-              <a:t>7/6/18</a:t>
+              <a:t>8/30/18</a:t>
             </a:fld>
             <a:endParaRPr lang="en-US" dirty="0"/>
           </a:p>
@@ -3000,7 +3002,7 @@
             <a:fld id="{87DE6118-2437-4B30-8E3C-4D2BE6020583}" type="datetimeFigureOut">
               <a:rPr lang="en-US" dirty="0"/>
               <a:pPr/>
-              <a:t>7/6/18</a:t>
+              <a:t>8/30/18</a:t>
             </a:fld>
             <a:endParaRPr lang="en-US" dirty="0"/>
           </a:p>
@@ -3385,7 +3387,7 @@
             <a:fld id="{87DE6118-2437-4B30-8E3C-4D2BE6020583}" type="datetimeFigureOut">
               <a:rPr lang="en-US" dirty="0"/>
               <a:pPr/>
-              <a:t>7/6/18</a:t>
+              <a:t>8/30/18</a:t>
             </a:fld>
             <a:endParaRPr lang="en-US" dirty="0"/>
           </a:p>
@@ -3660,7 +3662,7 @@
             <a:fld id="{87DE6118-2437-4B30-8E3C-4D2BE6020583}" type="datetimeFigureOut">
               <a:rPr lang="en-US" dirty="0"/>
               <a:pPr/>
-              <a:t>7/6/18</a:t>
+              <a:t>8/30/18</a:t>
             </a:fld>
             <a:endParaRPr lang="en-US" dirty="0"/>
           </a:p>
@@ -4278,8 +4280,13 @@
           <a:p>
             <a:r>
               <a:rPr lang="en-US" dirty="0"/>
-              <a:t>Grid</a:t>
-            </a:r>
+              <a:t>Sidebar w/ </a:t>
+            </a:r>
+            <a:r>
+              <a:rPr lang="en-US" dirty="0" err="1"/>
+              <a:t>Tabset</a:t>
+            </a:r>
+            <a:endParaRPr lang="en-US" dirty="0"/>
           </a:p>
         </p:txBody>
       </p:sp>
@@ -4307,15 +4314,15 @@
         </p:blipFill>
         <p:spPr>
           <a:xfrm>
-            <a:off x="2959100" y="685800"/>
-            <a:ext cx="8521700" cy="6053221"/>
+            <a:off x="1586575" y="1557866"/>
+            <a:ext cx="9171248" cy="5147733"/>
           </a:xfrm>
         </p:spPr>
       </p:pic>
     </p:spTree>
     <p:extLst>
       <p:ext uri="{BB962C8B-B14F-4D97-AF65-F5344CB8AC3E}">
-        <p14:creationId xmlns:p14="http://schemas.microsoft.com/office/powerpoint/2010/main" val="3505347648"/>
+        <p14:creationId xmlns:p14="http://schemas.microsoft.com/office/powerpoint/2010/main" val="2908924918"/>
       </p:ext>
     </p:extLst>
   </p:cSld>
@@ -4360,8 +4367,8 @@
         </p:blipFill>
         <p:spPr>
           <a:xfrm>
-            <a:off x="861530" y="945588"/>
-            <a:ext cx="9506832" cy="4207415"/>
+            <a:off x="801631" y="508783"/>
+            <a:ext cx="9626630" cy="5081025"/>
           </a:xfrm>
           <a:prstGeom prst="rect">
             <a:avLst/>
@@ -4371,7 +4378,7 @@
     </p:spTree>
     <p:extLst>
       <p:ext uri="{BB962C8B-B14F-4D97-AF65-F5344CB8AC3E}">
-        <p14:creationId xmlns:p14="http://schemas.microsoft.com/office/powerpoint/2010/main" val="1372024685"/>
+        <p14:creationId xmlns:p14="http://schemas.microsoft.com/office/powerpoint/2010/main" val="669670436"/>
       </p:ext>
     </p:extLst>
   </p:cSld>
@@ -4414,10 +4421,9 @@
           <a:lstStyle/>
           <a:p>
             <a:r>
-              <a:rPr lang="en-US" dirty="0" err="1"/>
-              <a:t>NavBar</a:t>
-            </a:r>
-            <a:endParaRPr lang="en-US" dirty="0"/>
+              <a:rPr lang="en-US" dirty="0"/>
+              <a:t>Grid</a:t>
+            </a:r>
           </a:p>
         </p:txBody>
       </p:sp>
@@ -4428,7 +4434,7 @@
             <a:picLocks noGrp="1" noChangeAspect="1"/>
           </p:cNvPicPr>
           <p:nvPr>
-            <p:ph sz="half" idx="1"/>
+            <p:ph idx="1"/>
           </p:nvPr>
         </p:nvPicPr>
         <p:blipFill>
@@ -4445,44 +4451,15 @@
         </p:blipFill>
         <p:spPr>
           <a:xfrm>
-            <a:off x="5168900" y="260701"/>
-            <a:ext cx="6919349" cy="3981099"/>
-          </a:xfrm>
-        </p:spPr>
-      </p:pic>
-      <p:pic>
-        <p:nvPicPr>
-          <p:cNvPr id="6" name="Content Placeholder 5"/>
-          <p:cNvPicPr>
-            <a:picLocks noGrp="1" noChangeAspect="1"/>
-          </p:cNvPicPr>
-          <p:nvPr>
-            <p:ph sz="half" idx="2"/>
-          </p:nvPr>
-        </p:nvPicPr>
-        <p:blipFill>
-          <a:blip r:embed="rId3">
-            <a:extLst>
-              <a:ext uri="{28A0092B-C50C-407E-A947-70E740481C1C}">
-                <a14:useLocalDpi xmlns:a14="http://schemas.microsoft.com/office/drawing/2010/main" val="0"/>
-              </a:ext>
-            </a:extLst>
-          </a:blip>
-          <a:stretch>
-            <a:fillRect/>
-          </a:stretch>
-        </p:blipFill>
-        <p:spPr>
-          <a:xfrm>
-            <a:off x="964589" y="3467100"/>
-            <a:ext cx="6782411" cy="3148976"/>
+            <a:off x="2959100" y="685800"/>
+            <a:ext cx="8521700" cy="6053221"/>
           </a:xfrm>
         </p:spPr>
       </p:pic>
     </p:spTree>
     <p:extLst>
       <p:ext uri="{BB962C8B-B14F-4D97-AF65-F5344CB8AC3E}">
-        <p14:creationId xmlns:p14="http://schemas.microsoft.com/office/powerpoint/2010/main" val="3013415046"/>
+        <p14:creationId xmlns:p14="http://schemas.microsoft.com/office/powerpoint/2010/main" val="3505347648"/>
       </p:ext>
     </p:extLst>
   </p:cSld>
@@ -4527,6 +4504,173 @@
         </p:blipFill>
         <p:spPr>
           <a:xfrm>
+            <a:off x="861530" y="945588"/>
+            <a:ext cx="9506832" cy="4207415"/>
+          </a:xfrm>
+          <a:prstGeom prst="rect">
+            <a:avLst/>
+          </a:prstGeom>
+        </p:spPr>
+      </p:pic>
+    </p:spTree>
+    <p:extLst>
+      <p:ext uri="{BB962C8B-B14F-4D97-AF65-F5344CB8AC3E}">
+        <p14:creationId xmlns:p14="http://schemas.microsoft.com/office/powerpoint/2010/main" val="1372024685"/>
+      </p:ext>
+    </p:extLst>
+  </p:cSld>
+  <p:clrMapOvr>
+    <a:masterClrMapping/>
+  </p:clrMapOvr>
+</p:sld>
+</file>
+
+<file path=ppt/slides/slide14.xml><?xml version="1.0" encoding="utf-8"?>
+<p:sld xmlns:a="http://schemas.openxmlformats.org/drawingml/2006/main" xmlns:r="http://schemas.openxmlformats.org/officeDocument/2006/relationships" xmlns:p="http://schemas.openxmlformats.org/presentationml/2006/main">
+  <p:cSld>
+    <p:spTree>
+      <p:nvGrpSpPr>
+        <p:cNvPr id="1" name=""/>
+        <p:cNvGrpSpPr/>
+        <p:nvPr/>
+      </p:nvGrpSpPr>
+      <p:grpSpPr>
+        <a:xfrm>
+          <a:off x="0" y="0"/>
+          <a:ext cx="0" cy="0"/>
+          <a:chOff x="0" y="0"/>
+          <a:chExt cx="0" cy="0"/>
+        </a:xfrm>
+      </p:grpSpPr>
+      <p:sp>
+        <p:nvSpPr>
+          <p:cNvPr id="2" name="Title 1"/>
+          <p:cNvSpPr>
+            <a:spLocks noGrp="1"/>
+          </p:cNvSpPr>
+          <p:nvPr>
+            <p:ph type="title"/>
+          </p:nvPr>
+        </p:nvSpPr>
+        <p:spPr/>
+        <p:txBody>
+          <a:bodyPr/>
+          <a:lstStyle/>
+          <a:p>
+            <a:r>
+              <a:rPr lang="en-US" dirty="0" err="1"/>
+              <a:t>NavBar</a:t>
+            </a:r>
+            <a:endParaRPr lang="en-US" dirty="0"/>
+          </a:p>
+        </p:txBody>
+      </p:sp>
+      <p:pic>
+        <p:nvPicPr>
+          <p:cNvPr id="5" name="Content Placeholder 4"/>
+          <p:cNvPicPr>
+            <a:picLocks noGrp="1" noChangeAspect="1"/>
+          </p:cNvPicPr>
+          <p:nvPr>
+            <p:ph sz="half" idx="1"/>
+          </p:nvPr>
+        </p:nvPicPr>
+        <p:blipFill>
+          <a:blip r:embed="rId2">
+            <a:extLst>
+              <a:ext uri="{28A0092B-C50C-407E-A947-70E740481C1C}">
+                <a14:useLocalDpi xmlns:a14="http://schemas.microsoft.com/office/drawing/2010/main" val="0"/>
+              </a:ext>
+            </a:extLst>
+          </a:blip>
+          <a:stretch>
+            <a:fillRect/>
+          </a:stretch>
+        </p:blipFill>
+        <p:spPr>
+          <a:xfrm>
+            <a:off x="5168900" y="260701"/>
+            <a:ext cx="6919349" cy="3981099"/>
+          </a:xfrm>
+        </p:spPr>
+      </p:pic>
+      <p:pic>
+        <p:nvPicPr>
+          <p:cNvPr id="6" name="Content Placeholder 5"/>
+          <p:cNvPicPr>
+            <a:picLocks noGrp="1" noChangeAspect="1"/>
+          </p:cNvPicPr>
+          <p:nvPr>
+            <p:ph sz="half" idx="2"/>
+          </p:nvPr>
+        </p:nvPicPr>
+        <p:blipFill>
+          <a:blip r:embed="rId3">
+            <a:extLst>
+              <a:ext uri="{28A0092B-C50C-407E-A947-70E740481C1C}">
+                <a14:useLocalDpi xmlns:a14="http://schemas.microsoft.com/office/drawing/2010/main" val="0"/>
+              </a:ext>
+            </a:extLst>
+          </a:blip>
+          <a:stretch>
+            <a:fillRect/>
+          </a:stretch>
+        </p:blipFill>
+        <p:spPr>
+          <a:xfrm>
+            <a:off x="964589" y="3467100"/>
+            <a:ext cx="6782411" cy="3148976"/>
+          </a:xfrm>
+        </p:spPr>
+      </p:pic>
+    </p:spTree>
+    <p:extLst>
+      <p:ext uri="{BB962C8B-B14F-4D97-AF65-F5344CB8AC3E}">
+        <p14:creationId xmlns:p14="http://schemas.microsoft.com/office/powerpoint/2010/main" val="3013415046"/>
+      </p:ext>
+    </p:extLst>
+  </p:cSld>
+  <p:clrMapOvr>
+    <a:masterClrMapping/>
+  </p:clrMapOvr>
+</p:sld>
+</file>
+
+<file path=ppt/slides/slide15.xml><?xml version="1.0" encoding="utf-8"?>
+<p:sld xmlns:a="http://schemas.openxmlformats.org/drawingml/2006/main" xmlns:r="http://schemas.openxmlformats.org/officeDocument/2006/relationships" xmlns:p="http://schemas.openxmlformats.org/presentationml/2006/main">
+  <p:cSld>
+    <p:spTree>
+      <p:nvGrpSpPr>
+        <p:cNvPr id="1" name=""/>
+        <p:cNvGrpSpPr/>
+        <p:nvPr/>
+      </p:nvGrpSpPr>
+      <p:grpSpPr>
+        <a:xfrm>
+          <a:off x="0" y="0"/>
+          <a:ext cx="0" cy="0"/>
+          <a:chOff x="0" y="0"/>
+          <a:chExt cx="0" cy="0"/>
+        </a:xfrm>
+      </p:grpSpPr>
+      <p:pic>
+        <p:nvPicPr>
+          <p:cNvPr id="4" name="Content Placeholder 3"/>
+          <p:cNvPicPr>
+            <a:picLocks noGrp="1" noChangeAspect="1"/>
+          </p:cNvPicPr>
+          <p:nvPr>
+            <p:ph idx="1"/>
+          </p:nvPr>
+        </p:nvPicPr>
+        <p:blipFill>
+          <a:blip r:embed="rId2"/>
+          <a:stretch>
+            <a:fillRect/>
+          </a:stretch>
+        </p:blipFill>
+        <p:spPr>
+          <a:xfrm>
             <a:off x="1086454" y="884380"/>
             <a:ext cx="9056984" cy="4329829"/>
           </a:xfrm>
@@ -4548,7 +4692,1168 @@
 </p:sld>
 </file>
 
-<file path=ppt/slides/slide14.xml><?xml version="1.0" encoding="utf-8"?>
+<file path=ppt/slides/slide16.xml><?xml version="1.0" encoding="utf-8"?>
+<p:sld xmlns:a="http://schemas.openxmlformats.org/drawingml/2006/main" xmlns:r="http://schemas.openxmlformats.org/officeDocument/2006/relationships" xmlns:p="http://schemas.openxmlformats.org/presentationml/2006/main">
+  <p:cSld>
+    <p:spTree>
+      <p:nvGrpSpPr>
+        <p:cNvPr id="1" name=""/>
+        <p:cNvGrpSpPr/>
+        <p:nvPr/>
+      </p:nvGrpSpPr>
+      <p:grpSpPr>
+        <a:xfrm>
+          <a:off x="0" y="0"/>
+          <a:ext cx="0" cy="0"/>
+          <a:chOff x="0" y="0"/>
+          <a:chExt cx="0" cy="0"/>
+        </a:xfrm>
+      </p:grpSpPr>
+      <p:sp>
+        <p:nvSpPr>
+          <p:cNvPr id="2" name="Title 1"/>
+          <p:cNvSpPr>
+            <a:spLocks noGrp="1"/>
+          </p:cNvSpPr>
+          <p:nvPr>
+            <p:ph type="title"/>
+          </p:nvPr>
+        </p:nvSpPr>
+        <p:spPr/>
+        <p:txBody>
+          <a:bodyPr/>
+          <a:lstStyle/>
+          <a:p>
+            <a:r>
+              <a:rPr lang="en-US" dirty="0"/>
+              <a:t>Basic Concepts of Shiny apps</a:t>
+            </a:r>
+          </a:p>
+        </p:txBody>
+      </p:sp>
+      <p:sp>
+        <p:nvSpPr>
+          <p:cNvPr id="3" name="Text Placeholder 2"/>
+          <p:cNvSpPr>
+            <a:spLocks noGrp="1"/>
+          </p:cNvSpPr>
+          <p:nvPr>
+            <p:ph type="body" idx="1"/>
+          </p:nvPr>
+        </p:nvSpPr>
+        <p:spPr/>
+        <p:txBody>
+          <a:bodyPr/>
+          <a:lstStyle/>
+          <a:p>
+            <a:r>
+              <a:rPr lang="en-US" dirty="0"/>
+              <a:t>Intro to Server</a:t>
+            </a:r>
+          </a:p>
+        </p:txBody>
+      </p:sp>
+    </p:spTree>
+    <p:extLst>
+      <p:ext uri="{BB962C8B-B14F-4D97-AF65-F5344CB8AC3E}">
+        <p14:creationId xmlns:p14="http://schemas.microsoft.com/office/powerpoint/2010/main" val="1276190698"/>
+      </p:ext>
+    </p:extLst>
+  </p:cSld>
+  <p:clrMapOvr>
+    <a:masterClrMapping/>
+  </p:clrMapOvr>
+</p:sld>
+</file>
+
+<file path=ppt/slides/slide17.xml><?xml version="1.0" encoding="utf-8"?>
+<p:sld xmlns:a="http://schemas.openxmlformats.org/drawingml/2006/main" xmlns:r="http://schemas.openxmlformats.org/officeDocument/2006/relationships" xmlns:p="http://schemas.openxmlformats.org/presentationml/2006/main">
+  <p:cSld>
+    <p:spTree>
+      <p:nvGrpSpPr>
+        <p:cNvPr id="1" name=""/>
+        <p:cNvGrpSpPr/>
+        <p:nvPr/>
+      </p:nvGrpSpPr>
+      <p:grpSpPr>
+        <a:xfrm>
+          <a:off x="0" y="0"/>
+          <a:ext cx="0" cy="0"/>
+          <a:chOff x="0" y="0"/>
+          <a:chExt cx="0" cy="0"/>
+        </a:xfrm>
+      </p:grpSpPr>
+      <p:sp>
+        <p:nvSpPr>
+          <p:cNvPr id="2" name="Title 1"/>
+          <p:cNvSpPr>
+            <a:spLocks noGrp="1"/>
+          </p:cNvSpPr>
+          <p:nvPr>
+            <p:ph type="title"/>
+          </p:nvPr>
+        </p:nvSpPr>
+        <p:spPr/>
+        <p:txBody>
+          <a:bodyPr/>
+          <a:lstStyle/>
+          <a:p>
+            <a:r>
+              <a:rPr lang="en-US" dirty="0"/>
+              <a:t>Introduction to Server Function</a:t>
+            </a:r>
+          </a:p>
+        </p:txBody>
+      </p:sp>
+      <p:sp>
+        <p:nvSpPr>
+          <p:cNvPr id="3" name="Content Placeholder 2"/>
+          <p:cNvSpPr>
+            <a:spLocks noGrp="1"/>
+          </p:cNvSpPr>
+          <p:nvPr>
+            <p:ph idx="1"/>
+          </p:nvPr>
+        </p:nvSpPr>
+        <p:spPr>
+          <a:xfrm>
+            <a:off x="1371600" y="2286000"/>
+            <a:ext cx="9601200" cy="2235200"/>
+          </a:xfrm>
+        </p:spPr>
+        <p:txBody>
+          <a:bodyPr>
+            <a:normAutofit/>
+          </a:bodyPr>
+          <a:lstStyle/>
+          <a:p>
+            <a:r>
+              <a:rPr lang="en-US" dirty="0"/>
+              <a:t>Outputs</a:t>
+            </a:r>
+          </a:p>
+          <a:p>
+            <a:pPr lvl="1"/>
+            <a:r>
+              <a:rPr lang="en-US" dirty="0"/>
+              <a:t>List of functions called in the UI which generates plots, tables and other objects.</a:t>
+            </a:r>
+          </a:p>
+          <a:p>
+            <a:pPr lvl="1"/>
+            <a:r>
+              <a:rPr lang="en-US" dirty="0"/>
+              <a:t>Will regenerate whenever dependent inputs are changed, or based off of required action in UI.</a:t>
+            </a:r>
+          </a:p>
+          <a:p>
+            <a:pPr lvl="1"/>
+            <a:r>
+              <a:rPr lang="en-US" dirty="0"/>
+              <a:t>Shiny Apps will display from any graphics package including;</a:t>
+            </a:r>
+          </a:p>
+          <a:p>
+            <a:pPr lvl="2"/>
+            <a:endParaRPr lang="en-US" dirty="0"/>
+          </a:p>
+        </p:txBody>
+      </p:sp>
+      <p:sp>
+        <p:nvSpPr>
+          <p:cNvPr id="4" name="TextBox 3"/>
+          <p:cNvSpPr txBox="1"/>
+          <p:nvPr/>
+        </p:nvSpPr>
+        <p:spPr>
+          <a:xfrm>
+            <a:off x="2781300" y="4521200"/>
+            <a:ext cx="7620000" cy="2031325"/>
+          </a:xfrm>
+          <a:prstGeom prst="rect">
+            <a:avLst/>
+          </a:prstGeom>
+          <a:noFill/>
+        </p:spPr>
+        <p:txBody>
+          <a:bodyPr wrap="square" numCol="3" rtlCol="0">
+            <a:spAutoFit/>
+          </a:bodyPr>
+          <a:lstStyle/>
+          <a:p>
+            <a:pPr marL="1200150" lvl="2" indent="-285750">
+              <a:buFont typeface="Arial" charset="0"/>
+              <a:buChar char="•"/>
+            </a:pPr>
+            <a:r>
+              <a:rPr lang="en-US" dirty="0"/>
+              <a:t>ggplot2</a:t>
+            </a:r>
+          </a:p>
+          <a:p>
+            <a:pPr marL="1200150" lvl="2" indent="-285750">
+              <a:buFont typeface="Arial" charset="0"/>
+              <a:buChar char="•"/>
+            </a:pPr>
+            <a:r>
+              <a:rPr lang="en-US" dirty="0" err="1"/>
+              <a:t>plotly</a:t>
+            </a:r>
+            <a:endParaRPr lang="en-US" dirty="0"/>
+          </a:p>
+          <a:p>
+            <a:pPr marL="1200150" lvl="2" indent="-285750">
+              <a:buFont typeface="Arial" charset="0"/>
+              <a:buChar char="•"/>
+            </a:pPr>
+            <a:r>
+              <a:rPr lang="en-US" dirty="0"/>
+              <a:t>DT</a:t>
+            </a:r>
+          </a:p>
+          <a:p>
+            <a:pPr marL="1200150" lvl="2" indent="-285750">
+              <a:buFont typeface="Arial" charset="0"/>
+              <a:buChar char="•"/>
+            </a:pPr>
+            <a:r>
+              <a:rPr lang="en-US" dirty="0" err="1"/>
+              <a:t>LeafletR</a:t>
+            </a:r>
+            <a:endParaRPr lang="en-US" dirty="0"/>
+          </a:p>
+          <a:p>
+            <a:pPr marL="1200150" lvl="2" indent="-285750">
+              <a:buFont typeface="Arial" charset="0"/>
+              <a:buChar char="•"/>
+            </a:pPr>
+            <a:r>
+              <a:rPr lang="en-US" dirty="0" err="1"/>
+              <a:t>ggvis</a:t>
+            </a:r>
+            <a:endParaRPr lang="en-US" dirty="0"/>
+          </a:p>
+          <a:p>
+            <a:pPr marL="1200150" lvl="2" indent="-285750">
+              <a:buFont typeface="Arial" charset="0"/>
+              <a:buChar char="•"/>
+            </a:pPr>
+            <a:r>
+              <a:rPr lang="en-US" dirty="0" err="1"/>
+              <a:t>googleVis</a:t>
+            </a:r>
+            <a:endParaRPr lang="en-US" dirty="0"/>
+          </a:p>
+          <a:p>
+            <a:pPr marL="1200150" lvl="2" indent="-285750">
+              <a:buFont typeface="Arial" charset="0"/>
+              <a:buChar char="•"/>
+            </a:pPr>
+            <a:r>
+              <a:rPr lang="en-US" dirty="0"/>
+              <a:t>wordcloud2</a:t>
+            </a:r>
+          </a:p>
+          <a:p>
+            <a:pPr marL="1200150" lvl="2" indent="-285750">
+              <a:buFont typeface="Arial" charset="0"/>
+              <a:buChar char="•"/>
+            </a:pPr>
+            <a:r>
+              <a:rPr lang="en-US" dirty="0"/>
+              <a:t>d3heatmap</a:t>
+            </a:r>
+          </a:p>
+          <a:p>
+            <a:pPr marL="1200150" lvl="2" indent="-285750">
+              <a:buFont typeface="Arial" charset="0"/>
+              <a:buChar char="•"/>
+            </a:pPr>
+            <a:r>
+              <a:rPr lang="en-US" dirty="0" err="1"/>
+              <a:t>dygraphs</a:t>
+            </a:r>
+            <a:endParaRPr lang="en-US" dirty="0"/>
+          </a:p>
+          <a:p>
+            <a:pPr marL="1200150" lvl="2" indent="-285750">
+              <a:buFont typeface="Arial" charset="0"/>
+              <a:buChar char="•"/>
+            </a:pPr>
+            <a:r>
+              <a:rPr lang="en-US" dirty="0" err="1"/>
+              <a:t>ggmap</a:t>
+            </a:r>
+            <a:endParaRPr lang="en-US" dirty="0"/>
+          </a:p>
+          <a:p>
+            <a:pPr marL="1200150" lvl="2" indent="-285750">
+              <a:buFont typeface="Arial" charset="0"/>
+              <a:buChar char="•"/>
+            </a:pPr>
+            <a:r>
+              <a:rPr lang="en-US" dirty="0" err="1"/>
+              <a:t>highcharter</a:t>
+            </a:r>
+            <a:endParaRPr lang="en-US" dirty="0"/>
+          </a:p>
+          <a:p>
+            <a:pPr marL="1200150" lvl="2" indent="-285750">
+              <a:buFont typeface="Arial" charset="0"/>
+              <a:buChar char="•"/>
+            </a:pPr>
+            <a:r>
+              <a:rPr lang="en-US" dirty="0" err="1"/>
+              <a:t>rgl</a:t>
+            </a:r>
+            <a:endParaRPr lang="en-US" dirty="0"/>
+          </a:p>
+          <a:p>
+            <a:pPr marL="1200150" lvl="2" indent="-285750">
+              <a:buFont typeface="Arial" charset="0"/>
+              <a:buChar char="•"/>
+            </a:pPr>
+            <a:r>
+              <a:rPr lang="en-US" dirty="0" err="1"/>
+              <a:t>DiagrammeR</a:t>
+            </a:r>
+            <a:endParaRPr lang="en-US" dirty="0"/>
+          </a:p>
+          <a:p>
+            <a:pPr marL="1200150" lvl="2" indent="-285750">
+              <a:buFont typeface="Arial" charset="0"/>
+              <a:buChar char="•"/>
+            </a:pPr>
+            <a:r>
+              <a:rPr lang="en-US" dirty="0" err="1"/>
+              <a:t>rCharts</a:t>
+            </a:r>
+            <a:endParaRPr lang="en-US" dirty="0"/>
+          </a:p>
+          <a:p>
+            <a:pPr marL="1200150" lvl="2" indent="-285750">
+              <a:buFont typeface="Arial" charset="0"/>
+              <a:buChar char="•"/>
+            </a:pPr>
+            <a:endParaRPr lang="en-US" dirty="0"/>
+          </a:p>
+          <a:p>
+            <a:pPr marL="1200150" lvl="2" indent="-285750">
+              <a:buFont typeface="Arial" charset="0"/>
+              <a:buChar char="•"/>
+            </a:pPr>
+            <a:endParaRPr lang="en-US" dirty="0"/>
+          </a:p>
+          <a:p>
+            <a:pPr marL="1200150" lvl="2" indent="-285750">
+              <a:buFont typeface="Arial" charset="0"/>
+              <a:buChar char="•"/>
+            </a:pPr>
+            <a:endParaRPr lang="en-US" dirty="0"/>
+          </a:p>
+          <a:p>
+            <a:pPr marL="1200150" lvl="2" indent="-285750">
+              <a:buFont typeface="Arial" charset="0"/>
+              <a:buChar char="•"/>
+            </a:pPr>
+            <a:endParaRPr lang="en-US" dirty="0"/>
+          </a:p>
+          <a:p>
+            <a:endParaRPr lang="en-US" dirty="0"/>
+          </a:p>
+        </p:txBody>
+      </p:sp>
+    </p:spTree>
+    <p:extLst>
+      <p:ext uri="{BB962C8B-B14F-4D97-AF65-F5344CB8AC3E}">
+        <p14:creationId xmlns:p14="http://schemas.microsoft.com/office/powerpoint/2010/main" val="706545499"/>
+      </p:ext>
+    </p:extLst>
+  </p:cSld>
+  <p:clrMapOvr>
+    <a:masterClrMapping/>
+  </p:clrMapOvr>
+</p:sld>
+</file>
+
+<file path=ppt/slides/slide18.xml><?xml version="1.0" encoding="utf-8"?>
+<p:sld xmlns:a="http://schemas.openxmlformats.org/drawingml/2006/main" xmlns:r="http://schemas.openxmlformats.org/officeDocument/2006/relationships" xmlns:p="http://schemas.openxmlformats.org/presentationml/2006/main">
+  <p:cSld>
+    <p:bg>
+      <p:bgPr>
+        <a:solidFill>
+          <a:schemeClr val="bg2"/>
+        </a:solidFill>
+        <a:effectLst/>
+      </p:bgPr>
+    </p:bg>
+    <p:spTree>
+      <p:nvGrpSpPr>
+        <p:cNvPr id="1" name=""/>
+        <p:cNvGrpSpPr/>
+        <p:nvPr/>
+      </p:nvGrpSpPr>
+      <p:grpSpPr>
+        <a:xfrm>
+          <a:off x="0" y="0"/>
+          <a:ext cx="0" cy="0"/>
+          <a:chOff x="0" y="0"/>
+          <a:chExt cx="0" cy="0"/>
+        </a:xfrm>
+      </p:grpSpPr>
+      <p:sp>
+        <p:nvSpPr>
+          <p:cNvPr id="10" name="Rectangle 9"/>
+          <p:cNvSpPr>
+            <a:spLocks noGrp="1" noRot="1" noChangeAspect="1" noMove="1" noResize="1" noEditPoints="1" noAdjustHandles="1" noChangeArrowheads="1" noChangeShapeType="1" noTextEdit="1"/>
+          </p:cNvSpPr>
+          <p:nvPr>
+            <p:extLst>
+              <p:ext uri="{386F3935-93C4-4BCD-93E2-E3B085C9AB24}">
+                <p16:designElem xmlns:p16="http://schemas.microsoft.com/office/powerpoint/2015/main" val="1"/>
+              </p:ext>
+            </p:extLst>
+          </p:nvPr>
+        </p:nvSpPr>
+        <p:spPr bwMode="white">
+          <a:xfrm>
+            <a:off x="0" y="0"/>
+            <a:ext cx="12192000" cy="6858000"/>
+          </a:xfrm>
+          <a:prstGeom prst="rect">
+            <a:avLst/>
+          </a:prstGeom>
+          <a:solidFill>
+            <a:schemeClr val="bg2"/>
+          </a:solidFill>
+          <a:effectLst/>
+        </p:spPr>
+      </p:sp>
+      <p:sp>
+        <p:nvSpPr>
+          <p:cNvPr id="12" name="Rectangle 11" title="Side bar"/>
+          <p:cNvSpPr>
+            <a:spLocks noGrp="1" noRot="1" noChangeAspect="1" noMove="1" noResize="1" noEditPoints="1" noAdjustHandles="1" noChangeArrowheads="1" noChangeShapeType="1" noTextEdit="1"/>
+          </p:cNvSpPr>
+          <p:nvPr>
+            <p:extLst>
+              <p:ext uri="{386F3935-93C4-4BCD-93E2-E3B085C9AB24}">
+                <p16:designElem xmlns:p16="http://schemas.microsoft.com/office/powerpoint/2015/main" val="1"/>
+              </p:ext>
+            </p:extLst>
+          </p:nvPr>
+        </p:nvSpPr>
+        <p:spPr>
+          <a:xfrm>
+            <a:off x="478095" y="376"/>
+            <a:ext cx="228600" cy="6858000"/>
+          </a:xfrm>
+          <a:prstGeom prst="rect">
+            <a:avLst/>
+          </a:prstGeom>
+          <a:solidFill>
+            <a:schemeClr val="tx2"/>
+          </a:solidFill>
+          <a:ln>
+            <a:noFill/>
+          </a:ln>
+        </p:spPr>
+        <p:style>
+          <a:lnRef idx="2">
+            <a:schemeClr val="accent1">
+              <a:shade val="50000"/>
+            </a:schemeClr>
+          </a:lnRef>
+          <a:fillRef idx="1">
+            <a:schemeClr val="accent1"/>
+          </a:fillRef>
+          <a:effectRef idx="0">
+            <a:schemeClr val="accent1"/>
+          </a:effectRef>
+          <a:fontRef idx="minor">
+            <a:schemeClr val="lt1"/>
+          </a:fontRef>
+        </p:style>
+      </p:sp>
+      <p:pic>
+        <p:nvPicPr>
+          <p:cNvPr id="5" name="Content Placeholder 4"/>
+          <p:cNvPicPr>
+            <a:picLocks noGrp="1" noChangeAspect="1"/>
+          </p:cNvPicPr>
+          <p:nvPr>
+            <p:ph sz="half" idx="2"/>
+          </p:nvPr>
+        </p:nvPicPr>
+        <p:blipFill>
+          <a:blip r:embed="rId2">
+            <a:extLst>
+              <a:ext uri="{28A0092B-C50C-407E-A947-70E740481C1C}">
+                <a14:useLocalDpi xmlns:a14="http://schemas.microsoft.com/office/drawing/2010/main" val="0"/>
+              </a:ext>
+            </a:extLst>
+          </a:blip>
+          <a:stretch>
+            <a:fillRect/>
+          </a:stretch>
+        </p:blipFill>
+        <p:spPr>
+          <a:xfrm>
+            <a:off x="4799068" y="4550229"/>
+            <a:ext cx="6682315" cy="1687285"/>
+          </a:xfrm>
+          <a:prstGeom prst="rect">
+            <a:avLst/>
+          </a:prstGeom>
+        </p:spPr>
+      </p:pic>
+      <p:sp>
+        <p:nvSpPr>
+          <p:cNvPr id="14" name="Rectangle 13" title="Side bar"/>
+          <p:cNvSpPr>
+            <a:spLocks noGrp="1" noRot="1" noChangeAspect="1" noMove="1" noResize="1" noEditPoints="1" noAdjustHandles="1" noChangeArrowheads="1" noChangeShapeType="1" noTextEdit="1"/>
+          </p:cNvSpPr>
+          <p:nvPr>
+            <p:extLst>
+              <p:ext uri="{386F3935-93C4-4BCD-93E2-E3B085C9AB24}">
+                <p16:designElem xmlns:p16="http://schemas.microsoft.com/office/powerpoint/2015/main" val="1"/>
+              </p:ext>
+            </p:extLst>
+          </p:nvPr>
+        </p:nvSpPr>
+        <p:spPr>
+          <a:xfrm>
+            <a:off x="478095" y="376"/>
+            <a:ext cx="228600" cy="6858000"/>
+          </a:xfrm>
+          <a:prstGeom prst="rect">
+            <a:avLst/>
+          </a:prstGeom>
+          <a:solidFill>
+            <a:schemeClr val="tx2"/>
+          </a:solidFill>
+          <a:ln>
+            <a:noFill/>
+          </a:ln>
+        </p:spPr>
+        <p:style>
+          <a:lnRef idx="2">
+            <a:schemeClr val="accent1">
+              <a:shade val="50000"/>
+            </a:schemeClr>
+          </a:lnRef>
+          <a:fillRef idx="1">
+            <a:schemeClr val="accent1"/>
+          </a:fillRef>
+          <a:effectRef idx="0">
+            <a:schemeClr val="accent1"/>
+          </a:effectRef>
+          <a:fontRef idx="minor">
+            <a:schemeClr val="lt1"/>
+          </a:fontRef>
+        </p:style>
+      </p:sp>
+      <p:sp>
+        <p:nvSpPr>
+          <p:cNvPr id="2" name="Title 1"/>
+          <p:cNvSpPr>
+            <a:spLocks noGrp="1"/>
+          </p:cNvSpPr>
+          <p:nvPr>
+            <p:ph type="title"/>
+          </p:nvPr>
+        </p:nvSpPr>
+        <p:spPr>
+          <a:xfrm>
+            <a:off x="881744" y="631372"/>
+            <a:ext cx="3135086" cy="5606142"/>
+          </a:xfrm>
+        </p:spPr>
+        <p:txBody>
+          <a:bodyPr vert="horz" lIns="91440" tIns="45720" rIns="91440" bIns="45720" rtlCol="0" anchor="t">
+            <a:normAutofit/>
+          </a:bodyPr>
+          <a:lstStyle/>
+          <a:p>
+            <a:r>
+              <a:rPr lang="en-US" dirty="0"/>
+              <a:t>Saving Outputs</a:t>
+            </a:r>
+          </a:p>
+        </p:txBody>
+      </p:sp>
+      <p:sp>
+        <p:nvSpPr>
+          <p:cNvPr id="3" name="Content Placeholder 2"/>
+          <p:cNvSpPr>
+            <a:spLocks noGrp="1"/>
+          </p:cNvSpPr>
+          <p:nvPr>
+            <p:ph sz="half" idx="1"/>
+          </p:nvPr>
+        </p:nvSpPr>
+        <p:spPr>
+          <a:xfrm>
+            <a:off x="4741595" y="631371"/>
+            <a:ext cx="6797262" cy="3744685"/>
+          </a:xfrm>
+        </p:spPr>
+        <p:txBody>
+          <a:bodyPr vert="horz" lIns="91440" tIns="45720" rIns="91440" bIns="45720" rtlCol="0">
+            <a:normAutofit/>
+          </a:bodyPr>
+          <a:lstStyle/>
+          <a:p>
+            <a:r>
+              <a:rPr lang="en-US" dirty="0"/>
+              <a:t>Output is a list which you build onto as you create your visuals</a:t>
+            </a:r>
+          </a:p>
+          <a:p>
+            <a:r>
+              <a:rPr lang="en-US" dirty="0"/>
+              <a:t>Each entry in the list is called in the UI by the name saved.</a:t>
+            </a:r>
+          </a:p>
+          <a:p>
+            <a:r>
+              <a:rPr lang="en-US" dirty="0"/>
+              <a:t>Example:</a:t>
+            </a:r>
+          </a:p>
+          <a:p>
+            <a:pPr lvl="1"/>
+            <a:r>
+              <a:rPr lang="en-US" dirty="0"/>
+              <a:t>The three outputs below are called by “</a:t>
+            </a:r>
+            <a:r>
+              <a:rPr lang="en-US" dirty="0" err="1"/>
+              <a:t>report.table</a:t>
+            </a:r>
+            <a:r>
+              <a:rPr lang="en-US" dirty="0"/>
+              <a:t>”, “</a:t>
+            </a:r>
+            <a:r>
+              <a:rPr lang="en-US" dirty="0" err="1"/>
+              <a:t>downloadData</a:t>
+            </a:r>
+            <a:r>
+              <a:rPr lang="en-US" dirty="0"/>
+              <a:t>” and “map” respectively.</a:t>
+            </a:r>
+          </a:p>
+          <a:p>
+            <a:r>
+              <a:rPr lang="en-US" dirty="0"/>
+              <a:t>Otherwise these images work just like anything created in an </a:t>
+            </a:r>
+            <a:r>
+              <a:rPr lang="en-US" dirty="0" err="1"/>
+              <a:t>RMarkdown</a:t>
+            </a:r>
+            <a:r>
+              <a:rPr lang="en-US" dirty="0"/>
+              <a:t> document</a:t>
+            </a:r>
+          </a:p>
+          <a:p>
+            <a:endParaRPr lang="en-US" dirty="0"/>
+          </a:p>
+        </p:txBody>
+      </p:sp>
+    </p:spTree>
+    <p:extLst>
+      <p:ext uri="{BB962C8B-B14F-4D97-AF65-F5344CB8AC3E}">
+        <p14:creationId xmlns:p14="http://schemas.microsoft.com/office/powerpoint/2010/main" val="3697256943"/>
+      </p:ext>
+    </p:extLst>
+  </p:cSld>
+  <p:clrMapOvr>
+    <a:masterClrMapping/>
+  </p:clrMapOvr>
+</p:sld>
+</file>
+
+<file path=ppt/slides/slide19.xml><?xml version="1.0" encoding="utf-8"?>
+<p:sld xmlns:a="http://schemas.openxmlformats.org/drawingml/2006/main" xmlns:r="http://schemas.openxmlformats.org/officeDocument/2006/relationships" xmlns:p="http://schemas.openxmlformats.org/presentationml/2006/main">
+  <p:cSld>
+    <p:spTree>
+      <p:nvGrpSpPr>
+        <p:cNvPr id="1" name=""/>
+        <p:cNvGrpSpPr/>
+        <p:nvPr/>
+      </p:nvGrpSpPr>
+      <p:grpSpPr>
+        <a:xfrm>
+          <a:off x="0" y="0"/>
+          <a:ext cx="0" cy="0"/>
+          <a:chOff x="0" y="0"/>
+          <a:chExt cx="0" cy="0"/>
+        </a:xfrm>
+      </p:grpSpPr>
+      <p:sp>
+        <p:nvSpPr>
+          <p:cNvPr id="2" name="Title 1"/>
+          <p:cNvSpPr>
+            <a:spLocks noGrp="1"/>
+          </p:cNvSpPr>
+          <p:nvPr>
+            <p:ph type="title"/>
+          </p:nvPr>
+        </p:nvSpPr>
+        <p:spPr/>
+        <p:txBody>
+          <a:bodyPr/>
+          <a:lstStyle/>
+          <a:p>
+            <a:r>
+              <a:rPr lang="en-US" dirty="0"/>
+              <a:t>The Server Function</a:t>
+            </a:r>
+          </a:p>
+        </p:txBody>
+      </p:sp>
+      <p:sp>
+        <p:nvSpPr>
+          <p:cNvPr id="3" name="Text Placeholder 2"/>
+          <p:cNvSpPr>
+            <a:spLocks noGrp="1"/>
+          </p:cNvSpPr>
+          <p:nvPr>
+            <p:ph type="body" idx="1"/>
+          </p:nvPr>
+        </p:nvSpPr>
+        <p:spPr/>
+        <p:txBody>
+          <a:bodyPr/>
+          <a:lstStyle/>
+          <a:p>
+            <a:endParaRPr lang="en-US" dirty="0"/>
+          </a:p>
+        </p:txBody>
+      </p:sp>
+    </p:spTree>
+    <p:extLst>
+      <p:ext uri="{BB962C8B-B14F-4D97-AF65-F5344CB8AC3E}">
+        <p14:creationId xmlns:p14="http://schemas.microsoft.com/office/powerpoint/2010/main" val="1050279111"/>
+      </p:ext>
+    </p:extLst>
+  </p:cSld>
+  <p:clrMapOvr>
+    <a:masterClrMapping/>
+  </p:clrMapOvr>
+</p:sld>
+</file>
+
+<file path=ppt/slides/slide2.xml><?xml version="1.0" encoding="utf-8"?>
+<p:sld xmlns:a="http://schemas.openxmlformats.org/drawingml/2006/main" xmlns:r="http://schemas.openxmlformats.org/officeDocument/2006/relationships" xmlns:p="http://schemas.openxmlformats.org/presentationml/2006/main">
+  <p:cSld>
+    <p:spTree>
+      <p:nvGrpSpPr>
+        <p:cNvPr id="1" name=""/>
+        <p:cNvGrpSpPr/>
+        <p:nvPr/>
+      </p:nvGrpSpPr>
+      <p:grpSpPr>
+        <a:xfrm>
+          <a:off x="0" y="0"/>
+          <a:ext cx="0" cy="0"/>
+          <a:chOff x="0" y="0"/>
+          <a:chExt cx="0" cy="0"/>
+        </a:xfrm>
+      </p:grpSpPr>
+      <p:sp>
+        <p:nvSpPr>
+          <p:cNvPr id="2" name="Title 1">
+            <a:extLst>
+              <a:ext uri="{FF2B5EF4-FFF2-40B4-BE49-F238E27FC236}">
+                <a16:creationId xmlns:a16="http://schemas.microsoft.com/office/drawing/2014/main" id="{5D28679A-3BA5-7C4A-A696-48A54A33B80D}"/>
+              </a:ext>
+            </a:extLst>
+          </p:cNvPr>
+          <p:cNvSpPr>
+            <a:spLocks noGrp="1"/>
+          </p:cNvSpPr>
+          <p:nvPr>
+            <p:ph type="title"/>
+          </p:nvPr>
+        </p:nvSpPr>
+        <p:spPr/>
+        <p:txBody>
+          <a:bodyPr/>
+          <a:lstStyle/>
+          <a:p>
+            <a:r>
+              <a:rPr lang="en-US" dirty="0"/>
+              <a:t>Agenda</a:t>
+            </a:r>
+          </a:p>
+        </p:txBody>
+      </p:sp>
+      <p:sp>
+        <p:nvSpPr>
+          <p:cNvPr id="3" name="Content Placeholder 2">
+            <a:extLst>
+              <a:ext uri="{FF2B5EF4-FFF2-40B4-BE49-F238E27FC236}">
+                <a16:creationId xmlns:a16="http://schemas.microsoft.com/office/drawing/2014/main" id="{64B172E0-DDC7-1F44-ABB4-8D6A1BB8ED24}"/>
+              </a:ext>
+            </a:extLst>
+          </p:cNvPr>
+          <p:cNvSpPr>
+            <a:spLocks noGrp="1"/>
+          </p:cNvSpPr>
+          <p:nvPr>
+            <p:ph idx="1"/>
+          </p:nvPr>
+        </p:nvSpPr>
+        <p:spPr/>
+        <p:txBody>
+          <a:bodyPr/>
+          <a:lstStyle/>
+          <a:p>
+            <a:r>
+              <a:rPr lang="en-US" dirty="0"/>
+              <a:t>Review</a:t>
+            </a:r>
+          </a:p>
+          <a:p>
+            <a:r>
+              <a:rPr lang="en-US" dirty="0"/>
+              <a:t>User Interfaces</a:t>
+            </a:r>
+          </a:p>
+          <a:p>
+            <a:r>
+              <a:rPr lang="en-US" dirty="0"/>
+              <a:t>Basic Concepts of Shiny</a:t>
+            </a:r>
+          </a:p>
+          <a:p>
+            <a:r>
+              <a:rPr lang="en-US" dirty="0"/>
+              <a:t>Server Function</a:t>
+            </a:r>
+          </a:p>
+        </p:txBody>
+      </p:sp>
+    </p:spTree>
+    <p:extLst>
+      <p:ext uri="{BB962C8B-B14F-4D97-AF65-F5344CB8AC3E}">
+        <p14:creationId xmlns:p14="http://schemas.microsoft.com/office/powerpoint/2010/main" val="2754351957"/>
+      </p:ext>
+    </p:extLst>
+  </p:cSld>
+  <p:clrMapOvr>
+    <a:masterClrMapping/>
+  </p:clrMapOvr>
+</p:sld>
+</file>
+
+<file path=ppt/slides/slide20.xml><?xml version="1.0" encoding="utf-8"?>
+<p:sld xmlns:a="http://schemas.openxmlformats.org/drawingml/2006/main" xmlns:r="http://schemas.openxmlformats.org/officeDocument/2006/relationships" xmlns:p="http://schemas.openxmlformats.org/presentationml/2006/main">
+  <p:cSld>
+    <p:spTree>
+      <p:nvGrpSpPr>
+        <p:cNvPr id="1" name=""/>
+        <p:cNvGrpSpPr/>
+        <p:nvPr/>
+      </p:nvGrpSpPr>
+      <p:grpSpPr>
+        <a:xfrm>
+          <a:off x="0" y="0"/>
+          <a:ext cx="0" cy="0"/>
+          <a:chOff x="0" y="0"/>
+          <a:chExt cx="0" cy="0"/>
+        </a:xfrm>
+      </p:grpSpPr>
+      <p:sp>
+        <p:nvSpPr>
+          <p:cNvPr id="2" name="Title 1"/>
+          <p:cNvSpPr>
+            <a:spLocks noGrp="1"/>
+          </p:cNvSpPr>
+          <p:nvPr>
+            <p:ph type="title"/>
+          </p:nvPr>
+        </p:nvSpPr>
+        <p:spPr>
+          <a:xfrm>
+            <a:off x="881744" y="631372"/>
+            <a:ext cx="3135086" cy="5606142"/>
+          </a:xfrm>
+        </p:spPr>
+        <p:txBody>
+          <a:bodyPr vert="horz" lIns="91440" tIns="45720" rIns="91440" bIns="45720" rtlCol="0" anchor="t">
+            <a:normAutofit/>
+          </a:bodyPr>
+          <a:lstStyle/>
+          <a:p>
+            <a:r>
+              <a:rPr lang="en-US" dirty="0"/>
+              <a:t>Calling Outputs</a:t>
+            </a:r>
+          </a:p>
+        </p:txBody>
+      </p:sp>
+      <p:sp>
+        <p:nvSpPr>
+          <p:cNvPr id="3" name="Content Placeholder 2"/>
+          <p:cNvSpPr>
+            <a:spLocks noGrp="1"/>
+          </p:cNvSpPr>
+          <p:nvPr>
+            <p:ph sz="half" idx="1"/>
+          </p:nvPr>
+        </p:nvSpPr>
+        <p:spPr>
+          <a:xfrm>
+            <a:off x="4741595" y="631372"/>
+            <a:ext cx="6797262" cy="1926478"/>
+          </a:xfrm>
+        </p:spPr>
+        <p:txBody>
+          <a:bodyPr vert="horz" lIns="91440" tIns="45720" rIns="91440" bIns="45720" rtlCol="0">
+            <a:normAutofit/>
+          </a:bodyPr>
+          <a:lstStyle/>
+          <a:p>
+            <a:r>
+              <a:rPr lang="en-US" dirty="0"/>
+              <a:t>Output is a list which you build onto as you create your visuals</a:t>
+            </a:r>
+          </a:p>
+          <a:p>
+            <a:r>
+              <a:rPr lang="en-US" dirty="0"/>
+              <a:t>Each entry in the list is called in the UI by the name saved.</a:t>
+            </a:r>
+          </a:p>
+        </p:txBody>
+      </p:sp>
+      <p:pic>
+        <p:nvPicPr>
+          <p:cNvPr id="6" name="Picture 5"/>
+          <p:cNvPicPr>
+            <a:picLocks noChangeAspect="1"/>
+          </p:cNvPicPr>
+          <p:nvPr/>
+        </p:nvPicPr>
+        <p:blipFill>
+          <a:blip r:embed="rId2"/>
+          <a:stretch>
+            <a:fillRect/>
+          </a:stretch>
+        </p:blipFill>
+        <p:spPr>
+          <a:xfrm>
+            <a:off x="2712726" y="3964975"/>
+            <a:ext cx="7343775" cy="742950"/>
+          </a:xfrm>
+          <a:prstGeom prst="rect">
+            <a:avLst/>
+          </a:prstGeom>
+        </p:spPr>
+      </p:pic>
+    </p:spTree>
+    <p:extLst>
+      <p:ext uri="{BB962C8B-B14F-4D97-AF65-F5344CB8AC3E}">
+        <p14:creationId xmlns:p14="http://schemas.microsoft.com/office/powerpoint/2010/main" val="3914273472"/>
+      </p:ext>
+    </p:extLst>
+  </p:cSld>
+  <p:clrMapOvr>
+    <a:masterClrMapping/>
+  </p:clrMapOvr>
+</p:sld>
+</file>
+
+<file path=ppt/slides/slide21.xml><?xml version="1.0" encoding="utf-8"?>
+<p:sld xmlns:a="http://schemas.openxmlformats.org/drawingml/2006/main" xmlns:r="http://schemas.openxmlformats.org/officeDocument/2006/relationships" xmlns:p="http://schemas.openxmlformats.org/presentationml/2006/main">
+  <p:cSld>
+    <p:spTree>
+      <p:nvGrpSpPr>
+        <p:cNvPr id="1" name=""/>
+        <p:cNvGrpSpPr/>
+        <p:nvPr/>
+      </p:nvGrpSpPr>
+      <p:grpSpPr>
+        <a:xfrm>
+          <a:off x="0" y="0"/>
+          <a:ext cx="0" cy="0"/>
+          <a:chOff x="0" y="0"/>
+          <a:chExt cx="0" cy="0"/>
+        </a:xfrm>
+      </p:grpSpPr>
+      <p:sp>
+        <p:nvSpPr>
+          <p:cNvPr id="2" name="Title 1"/>
+          <p:cNvSpPr>
+            <a:spLocks noGrp="1"/>
+          </p:cNvSpPr>
+          <p:nvPr>
+            <p:ph type="title"/>
+          </p:nvPr>
+        </p:nvSpPr>
+        <p:spPr/>
+        <p:txBody>
+          <a:bodyPr/>
+          <a:lstStyle/>
+          <a:p>
+            <a:r>
+              <a:rPr lang="en-US" dirty="0"/>
+              <a:t>Server Function</a:t>
+            </a:r>
+          </a:p>
+        </p:txBody>
+      </p:sp>
+      <p:sp>
+        <p:nvSpPr>
+          <p:cNvPr id="3" name="Content Placeholder 2"/>
+          <p:cNvSpPr>
+            <a:spLocks noGrp="1"/>
+          </p:cNvSpPr>
+          <p:nvPr>
+            <p:ph idx="1"/>
+          </p:nvPr>
+        </p:nvSpPr>
+        <p:spPr>
+          <a:xfrm>
+            <a:off x="1371600" y="1528175"/>
+            <a:ext cx="9601200" cy="5173250"/>
+          </a:xfrm>
+        </p:spPr>
+        <p:txBody>
+          <a:bodyPr>
+            <a:normAutofit/>
+          </a:bodyPr>
+          <a:lstStyle/>
+          <a:p>
+            <a:r>
+              <a:rPr lang="en-US" dirty="0"/>
+              <a:t>Outputs</a:t>
+            </a:r>
+          </a:p>
+          <a:p>
+            <a:pPr lvl="1"/>
+            <a:r>
+              <a:rPr lang="en-US" dirty="0"/>
+              <a:t>List of functions called in the UI which generates plots, tables and other objects.</a:t>
+            </a:r>
+          </a:p>
+          <a:p>
+            <a:pPr lvl="1"/>
+            <a:r>
+              <a:rPr lang="en-US" dirty="0"/>
+              <a:t>Will regenerate whenever dependent inputs are changed, or based off of required action in UI.</a:t>
+            </a:r>
+          </a:p>
+          <a:p>
+            <a:pPr lvl="1"/>
+            <a:r>
+              <a:rPr lang="en-US" dirty="0"/>
+              <a:t>Shiny Apps will display from any graphics package including;</a:t>
+            </a:r>
+          </a:p>
+          <a:p>
+            <a:pPr marL="1200150" lvl="2" indent="-285750">
+              <a:buFont typeface="Arial" charset="0"/>
+              <a:buChar char="•"/>
+            </a:pPr>
+            <a:r>
+              <a:rPr lang="en-US" dirty="0"/>
+              <a:t>ggplot2</a:t>
+            </a:r>
+          </a:p>
+          <a:p>
+            <a:pPr marL="1200150" lvl="2" indent="-285750">
+              <a:buFont typeface="Arial" charset="0"/>
+              <a:buChar char="•"/>
+            </a:pPr>
+            <a:r>
+              <a:rPr lang="en-US" dirty="0" err="1"/>
+              <a:t>plotly</a:t>
+            </a:r>
+            <a:endParaRPr lang="en-US" dirty="0"/>
+          </a:p>
+          <a:p>
+            <a:pPr marL="1200150" lvl="2" indent="-285750">
+              <a:buFont typeface="Arial" charset="0"/>
+              <a:buChar char="•"/>
+            </a:pPr>
+            <a:r>
+              <a:rPr lang="en-US" dirty="0"/>
+              <a:t>DT</a:t>
+            </a:r>
+          </a:p>
+          <a:p>
+            <a:pPr marL="1200150" lvl="2" indent="-285750">
+              <a:buFont typeface="Arial" charset="0"/>
+              <a:buChar char="•"/>
+            </a:pPr>
+            <a:r>
+              <a:rPr lang="en-US" dirty="0" err="1"/>
+              <a:t>LeafletR</a:t>
+            </a:r>
+            <a:endParaRPr lang="en-US" dirty="0"/>
+          </a:p>
+          <a:p>
+            <a:pPr marL="1200150" lvl="2" indent="-285750">
+              <a:buFont typeface="Arial" charset="0"/>
+              <a:buChar char="•"/>
+            </a:pPr>
+            <a:r>
+              <a:rPr lang="en-US" dirty="0" err="1"/>
+              <a:t>googleVis</a:t>
+            </a:r>
+            <a:endParaRPr lang="en-US" dirty="0"/>
+          </a:p>
+          <a:p>
+            <a:pPr marL="1200150" lvl="2" indent="-285750">
+              <a:buFont typeface="Arial" charset="0"/>
+              <a:buChar char="•"/>
+            </a:pPr>
+            <a:r>
+              <a:rPr lang="en-US" dirty="0"/>
+              <a:t>wordcloud2</a:t>
+            </a:r>
+          </a:p>
+          <a:p>
+            <a:pPr marL="1200150" lvl="2" indent="-285750">
+              <a:buFont typeface="Arial" charset="0"/>
+              <a:buChar char="•"/>
+            </a:pPr>
+            <a:r>
+              <a:rPr lang="en-US" dirty="0" err="1"/>
+              <a:t>ggmap</a:t>
+            </a:r>
+            <a:endParaRPr lang="en-US" dirty="0"/>
+          </a:p>
+          <a:p>
+            <a:pPr lvl="2"/>
+            <a:endParaRPr lang="en-US" dirty="0"/>
+          </a:p>
+          <a:p>
+            <a:pPr lvl="2"/>
+            <a:endParaRPr lang="en-US" dirty="0"/>
+          </a:p>
+        </p:txBody>
+      </p:sp>
+    </p:spTree>
+    <p:extLst>
+      <p:ext uri="{BB962C8B-B14F-4D97-AF65-F5344CB8AC3E}">
+        <p14:creationId xmlns:p14="http://schemas.microsoft.com/office/powerpoint/2010/main" val="1507377180"/>
+      </p:ext>
+    </p:extLst>
+  </p:cSld>
+  <p:clrMapOvr>
+    <a:masterClrMapping/>
+  </p:clrMapOvr>
+</p:sld>
+</file>
+
+<file path=ppt/slides/slide22.xml><?xml version="1.0" encoding="utf-8"?>
 <p:sld xmlns:a="http://schemas.openxmlformats.org/drawingml/2006/main" xmlns:r="http://schemas.openxmlformats.org/officeDocument/2006/relationships" xmlns:p="http://schemas.openxmlformats.org/presentationml/2006/main">
   <p:cSld>
     <p:spTree>
@@ -4631,46 +5936,6 @@
           </a:p>
         </p:txBody>
       </p:sp>
-      <p:sp>
-        <p:nvSpPr>
-          <p:cNvPr id="6" name="Text Placeholder 5">
-            <a:extLst>
-              <a:ext uri="{FF2B5EF4-FFF2-40B4-BE49-F238E27FC236}">
-                <a16:creationId xmlns:a16="http://schemas.microsoft.com/office/drawing/2014/main" id="{DA0D8C01-B21F-964D-95C7-D634FF130788}"/>
-              </a:ext>
-            </a:extLst>
-          </p:cNvPr>
-          <p:cNvSpPr>
-            <a:spLocks noGrp="1"/>
-          </p:cNvSpPr>
-          <p:nvPr>
-            <p:ph type="body" idx="1"/>
-          </p:nvPr>
-        </p:nvSpPr>
-        <p:spPr>
-          <a:xfrm>
-            <a:off x="7610489" y="4708310"/>
-            <a:ext cx="3355942" cy="1794656"/>
-          </a:xfrm>
-        </p:spPr>
-        <p:txBody>
-          <a:bodyPr vert="horz" lIns="91440" tIns="45720" rIns="91440" bIns="45720" rtlCol="0">
-            <a:normAutofit/>
-          </a:bodyPr>
-          <a:lstStyle/>
-          <a:p>
-            <a:pPr algn="ctr"/>
-            <a:r>
-              <a:rPr lang="en-US" sz="2300"/>
-              <a:t>Dashboar</a:t>
-            </a:r>
-            <a:r>
-              <a:rPr lang="en-US" sz="2300" dirty="0"/>
-              <a:t>d</a:t>
-            </a:r>
-          </a:p>
-        </p:txBody>
-      </p:sp>
     </p:spTree>
     <p:extLst>
       <p:ext uri="{BB962C8B-B14F-4D97-AF65-F5344CB8AC3E}">
@@ -4684,1138 +5949,7 @@
 </p:sld>
 </file>
 
-<file path=ppt/slides/slide15.xml><?xml version="1.0" encoding="utf-8"?>
-<p:sld xmlns:a="http://schemas.openxmlformats.org/drawingml/2006/main" xmlns:r="http://schemas.openxmlformats.org/officeDocument/2006/relationships" xmlns:p="http://schemas.openxmlformats.org/presentationml/2006/main">
-  <p:cSld>
-    <p:spTree>
-      <p:nvGrpSpPr>
-        <p:cNvPr id="1" name=""/>
-        <p:cNvGrpSpPr/>
-        <p:nvPr/>
-      </p:nvGrpSpPr>
-      <p:grpSpPr>
-        <a:xfrm>
-          <a:off x="0" y="0"/>
-          <a:ext cx="0" cy="0"/>
-          <a:chOff x="0" y="0"/>
-          <a:chExt cx="0" cy="0"/>
-        </a:xfrm>
-      </p:grpSpPr>
-      <p:sp>
-        <p:nvSpPr>
-          <p:cNvPr id="2" name="Title 1"/>
-          <p:cNvSpPr>
-            <a:spLocks noGrp="1"/>
-          </p:cNvSpPr>
-          <p:nvPr>
-            <p:ph type="title"/>
-          </p:nvPr>
-        </p:nvSpPr>
-        <p:spPr/>
-        <p:txBody>
-          <a:bodyPr/>
-          <a:lstStyle/>
-          <a:p>
-            <a:r>
-              <a:rPr lang="en-US" dirty="0"/>
-              <a:t>Basic Concepts of Shiny apps</a:t>
-            </a:r>
-          </a:p>
-        </p:txBody>
-      </p:sp>
-      <p:sp>
-        <p:nvSpPr>
-          <p:cNvPr id="3" name="Text Placeholder 2"/>
-          <p:cNvSpPr>
-            <a:spLocks noGrp="1"/>
-          </p:cNvSpPr>
-          <p:nvPr>
-            <p:ph type="body" idx="1"/>
-          </p:nvPr>
-        </p:nvSpPr>
-        <p:spPr/>
-        <p:txBody>
-          <a:bodyPr/>
-          <a:lstStyle/>
-          <a:p>
-            <a:r>
-              <a:rPr lang="en-US" dirty="0"/>
-              <a:t>Intro to Server</a:t>
-            </a:r>
-          </a:p>
-        </p:txBody>
-      </p:sp>
-    </p:spTree>
-    <p:extLst>
-      <p:ext uri="{BB962C8B-B14F-4D97-AF65-F5344CB8AC3E}">
-        <p14:creationId xmlns:p14="http://schemas.microsoft.com/office/powerpoint/2010/main" val="1276190698"/>
-      </p:ext>
-    </p:extLst>
-  </p:cSld>
-  <p:clrMapOvr>
-    <a:masterClrMapping/>
-  </p:clrMapOvr>
-</p:sld>
-</file>
-
-<file path=ppt/slides/slide16.xml><?xml version="1.0" encoding="utf-8"?>
-<p:sld xmlns:a="http://schemas.openxmlformats.org/drawingml/2006/main" xmlns:r="http://schemas.openxmlformats.org/officeDocument/2006/relationships" xmlns:p="http://schemas.openxmlformats.org/presentationml/2006/main">
-  <p:cSld>
-    <p:spTree>
-      <p:nvGrpSpPr>
-        <p:cNvPr id="1" name=""/>
-        <p:cNvGrpSpPr/>
-        <p:nvPr/>
-      </p:nvGrpSpPr>
-      <p:grpSpPr>
-        <a:xfrm>
-          <a:off x="0" y="0"/>
-          <a:ext cx="0" cy="0"/>
-          <a:chOff x="0" y="0"/>
-          <a:chExt cx="0" cy="0"/>
-        </a:xfrm>
-      </p:grpSpPr>
-      <p:sp>
-        <p:nvSpPr>
-          <p:cNvPr id="2" name="Title 1"/>
-          <p:cNvSpPr>
-            <a:spLocks noGrp="1"/>
-          </p:cNvSpPr>
-          <p:nvPr>
-            <p:ph type="title"/>
-          </p:nvPr>
-        </p:nvSpPr>
-        <p:spPr/>
-        <p:txBody>
-          <a:bodyPr/>
-          <a:lstStyle/>
-          <a:p>
-            <a:r>
-              <a:rPr lang="en-US" dirty="0"/>
-              <a:t>Introduction to Server Function</a:t>
-            </a:r>
-          </a:p>
-        </p:txBody>
-      </p:sp>
-      <p:sp>
-        <p:nvSpPr>
-          <p:cNvPr id="3" name="Content Placeholder 2"/>
-          <p:cNvSpPr>
-            <a:spLocks noGrp="1"/>
-          </p:cNvSpPr>
-          <p:nvPr>
-            <p:ph idx="1"/>
-          </p:nvPr>
-        </p:nvSpPr>
-        <p:spPr>
-          <a:xfrm>
-            <a:off x="1371600" y="2286000"/>
-            <a:ext cx="9601200" cy="2235200"/>
-          </a:xfrm>
-        </p:spPr>
-        <p:txBody>
-          <a:bodyPr>
-            <a:normAutofit/>
-          </a:bodyPr>
-          <a:lstStyle/>
-          <a:p>
-            <a:r>
-              <a:rPr lang="en-US" dirty="0"/>
-              <a:t>Outputs</a:t>
-            </a:r>
-          </a:p>
-          <a:p>
-            <a:pPr lvl="1"/>
-            <a:r>
-              <a:rPr lang="en-US" dirty="0"/>
-              <a:t>List of functions called in the UI which generates plots, tables and other objects.</a:t>
-            </a:r>
-          </a:p>
-          <a:p>
-            <a:pPr lvl="1"/>
-            <a:r>
-              <a:rPr lang="en-US" dirty="0"/>
-              <a:t>Will regenerate whenever dependent inputs are changed, or based off of required action in UI.</a:t>
-            </a:r>
-          </a:p>
-          <a:p>
-            <a:pPr lvl="1"/>
-            <a:r>
-              <a:rPr lang="en-US" dirty="0"/>
-              <a:t>Shiny Apps will display from any graphics package including;</a:t>
-            </a:r>
-          </a:p>
-          <a:p>
-            <a:pPr lvl="2"/>
-            <a:endParaRPr lang="en-US" dirty="0"/>
-          </a:p>
-        </p:txBody>
-      </p:sp>
-      <p:sp>
-        <p:nvSpPr>
-          <p:cNvPr id="4" name="TextBox 3"/>
-          <p:cNvSpPr txBox="1"/>
-          <p:nvPr/>
-        </p:nvSpPr>
-        <p:spPr>
-          <a:xfrm>
-            <a:off x="2781300" y="4521200"/>
-            <a:ext cx="7620000" cy="2031325"/>
-          </a:xfrm>
-          <a:prstGeom prst="rect">
-            <a:avLst/>
-          </a:prstGeom>
-          <a:noFill/>
-        </p:spPr>
-        <p:txBody>
-          <a:bodyPr wrap="square" numCol="3" rtlCol="0">
-            <a:spAutoFit/>
-          </a:bodyPr>
-          <a:lstStyle/>
-          <a:p>
-            <a:pPr marL="1200150" lvl="2" indent="-285750">
-              <a:buFont typeface="Arial" charset="0"/>
-              <a:buChar char="•"/>
-            </a:pPr>
-            <a:r>
-              <a:rPr lang="en-US" dirty="0"/>
-              <a:t>ggplot2</a:t>
-            </a:r>
-          </a:p>
-          <a:p>
-            <a:pPr marL="1200150" lvl="2" indent="-285750">
-              <a:buFont typeface="Arial" charset="0"/>
-              <a:buChar char="•"/>
-            </a:pPr>
-            <a:r>
-              <a:rPr lang="en-US" dirty="0" err="1"/>
-              <a:t>plotly</a:t>
-            </a:r>
-            <a:endParaRPr lang="en-US" dirty="0"/>
-          </a:p>
-          <a:p>
-            <a:pPr marL="1200150" lvl="2" indent="-285750">
-              <a:buFont typeface="Arial" charset="0"/>
-              <a:buChar char="•"/>
-            </a:pPr>
-            <a:r>
-              <a:rPr lang="en-US" dirty="0"/>
-              <a:t>DT</a:t>
-            </a:r>
-          </a:p>
-          <a:p>
-            <a:pPr marL="1200150" lvl="2" indent="-285750">
-              <a:buFont typeface="Arial" charset="0"/>
-              <a:buChar char="•"/>
-            </a:pPr>
-            <a:r>
-              <a:rPr lang="en-US" dirty="0" err="1"/>
-              <a:t>LeafletR</a:t>
-            </a:r>
-            <a:endParaRPr lang="en-US" dirty="0"/>
-          </a:p>
-          <a:p>
-            <a:pPr marL="1200150" lvl="2" indent="-285750">
-              <a:buFont typeface="Arial" charset="0"/>
-              <a:buChar char="•"/>
-            </a:pPr>
-            <a:r>
-              <a:rPr lang="en-US" dirty="0" err="1"/>
-              <a:t>ggvis</a:t>
-            </a:r>
-            <a:endParaRPr lang="en-US" dirty="0"/>
-          </a:p>
-          <a:p>
-            <a:pPr marL="1200150" lvl="2" indent="-285750">
-              <a:buFont typeface="Arial" charset="0"/>
-              <a:buChar char="•"/>
-            </a:pPr>
-            <a:r>
-              <a:rPr lang="en-US" dirty="0" err="1"/>
-              <a:t>googleVis</a:t>
-            </a:r>
-            <a:endParaRPr lang="en-US" dirty="0"/>
-          </a:p>
-          <a:p>
-            <a:pPr marL="1200150" lvl="2" indent="-285750">
-              <a:buFont typeface="Arial" charset="0"/>
-              <a:buChar char="•"/>
-            </a:pPr>
-            <a:r>
-              <a:rPr lang="en-US" dirty="0"/>
-              <a:t>wordcloud2</a:t>
-            </a:r>
-          </a:p>
-          <a:p>
-            <a:pPr marL="1200150" lvl="2" indent="-285750">
-              <a:buFont typeface="Arial" charset="0"/>
-              <a:buChar char="•"/>
-            </a:pPr>
-            <a:r>
-              <a:rPr lang="en-US" dirty="0"/>
-              <a:t>d3heatmap</a:t>
-            </a:r>
-          </a:p>
-          <a:p>
-            <a:pPr marL="1200150" lvl="2" indent="-285750">
-              <a:buFont typeface="Arial" charset="0"/>
-              <a:buChar char="•"/>
-            </a:pPr>
-            <a:r>
-              <a:rPr lang="en-US" dirty="0" err="1"/>
-              <a:t>dygraphs</a:t>
-            </a:r>
-            <a:endParaRPr lang="en-US" dirty="0"/>
-          </a:p>
-          <a:p>
-            <a:pPr marL="1200150" lvl="2" indent="-285750">
-              <a:buFont typeface="Arial" charset="0"/>
-              <a:buChar char="•"/>
-            </a:pPr>
-            <a:r>
-              <a:rPr lang="en-US" dirty="0" err="1"/>
-              <a:t>ggmap</a:t>
-            </a:r>
-            <a:endParaRPr lang="en-US" dirty="0"/>
-          </a:p>
-          <a:p>
-            <a:pPr marL="1200150" lvl="2" indent="-285750">
-              <a:buFont typeface="Arial" charset="0"/>
-              <a:buChar char="•"/>
-            </a:pPr>
-            <a:r>
-              <a:rPr lang="en-US" dirty="0" err="1"/>
-              <a:t>highcharter</a:t>
-            </a:r>
-            <a:endParaRPr lang="en-US" dirty="0"/>
-          </a:p>
-          <a:p>
-            <a:pPr marL="1200150" lvl="2" indent="-285750">
-              <a:buFont typeface="Arial" charset="0"/>
-              <a:buChar char="•"/>
-            </a:pPr>
-            <a:r>
-              <a:rPr lang="en-US" dirty="0" err="1"/>
-              <a:t>rgl</a:t>
-            </a:r>
-            <a:endParaRPr lang="en-US" dirty="0"/>
-          </a:p>
-          <a:p>
-            <a:pPr marL="1200150" lvl="2" indent="-285750">
-              <a:buFont typeface="Arial" charset="0"/>
-              <a:buChar char="•"/>
-            </a:pPr>
-            <a:r>
-              <a:rPr lang="en-US" dirty="0" err="1"/>
-              <a:t>DiagrammeR</a:t>
-            </a:r>
-            <a:endParaRPr lang="en-US" dirty="0"/>
-          </a:p>
-          <a:p>
-            <a:pPr marL="1200150" lvl="2" indent="-285750">
-              <a:buFont typeface="Arial" charset="0"/>
-              <a:buChar char="•"/>
-            </a:pPr>
-            <a:r>
-              <a:rPr lang="en-US" dirty="0" err="1"/>
-              <a:t>rCharts</a:t>
-            </a:r>
-            <a:endParaRPr lang="en-US" dirty="0"/>
-          </a:p>
-          <a:p>
-            <a:pPr marL="1200150" lvl="2" indent="-285750">
-              <a:buFont typeface="Arial" charset="0"/>
-              <a:buChar char="•"/>
-            </a:pPr>
-            <a:endParaRPr lang="en-US" dirty="0"/>
-          </a:p>
-          <a:p>
-            <a:pPr marL="1200150" lvl="2" indent="-285750">
-              <a:buFont typeface="Arial" charset="0"/>
-              <a:buChar char="•"/>
-            </a:pPr>
-            <a:endParaRPr lang="en-US" dirty="0"/>
-          </a:p>
-          <a:p>
-            <a:pPr marL="1200150" lvl="2" indent="-285750">
-              <a:buFont typeface="Arial" charset="0"/>
-              <a:buChar char="•"/>
-            </a:pPr>
-            <a:endParaRPr lang="en-US" dirty="0"/>
-          </a:p>
-          <a:p>
-            <a:pPr marL="1200150" lvl="2" indent="-285750">
-              <a:buFont typeface="Arial" charset="0"/>
-              <a:buChar char="•"/>
-            </a:pPr>
-            <a:endParaRPr lang="en-US" dirty="0"/>
-          </a:p>
-          <a:p>
-            <a:endParaRPr lang="en-US" dirty="0"/>
-          </a:p>
-        </p:txBody>
-      </p:sp>
-    </p:spTree>
-    <p:extLst>
-      <p:ext uri="{BB962C8B-B14F-4D97-AF65-F5344CB8AC3E}">
-        <p14:creationId xmlns:p14="http://schemas.microsoft.com/office/powerpoint/2010/main" val="706545499"/>
-      </p:ext>
-    </p:extLst>
-  </p:cSld>
-  <p:clrMapOvr>
-    <a:masterClrMapping/>
-  </p:clrMapOvr>
-</p:sld>
-</file>
-
-<file path=ppt/slides/slide17.xml><?xml version="1.0" encoding="utf-8"?>
-<p:sld xmlns:a="http://schemas.openxmlformats.org/drawingml/2006/main" xmlns:r="http://schemas.openxmlformats.org/officeDocument/2006/relationships" xmlns:p="http://schemas.openxmlformats.org/presentationml/2006/main">
-  <p:cSld>
-    <p:bg>
-      <p:bgPr>
-        <a:solidFill>
-          <a:schemeClr val="bg2"/>
-        </a:solidFill>
-        <a:effectLst/>
-      </p:bgPr>
-    </p:bg>
-    <p:spTree>
-      <p:nvGrpSpPr>
-        <p:cNvPr id="1" name=""/>
-        <p:cNvGrpSpPr/>
-        <p:nvPr/>
-      </p:nvGrpSpPr>
-      <p:grpSpPr>
-        <a:xfrm>
-          <a:off x="0" y="0"/>
-          <a:ext cx="0" cy="0"/>
-          <a:chOff x="0" y="0"/>
-          <a:chExt cx="0" cy="0"/>
-        </a:xfrm>
-      </p:grpSpPr>
-      <p:sp>
-        <p:nvSpPr>
-          <p:cNvPr id="10" name="Rectangle 9"/>
-          <p:cNvSpPr>
-            <a:spLocks noGrp="1" noRot="1" noChangeAspect="1" noMove="1" noResize="1" noEditPoints="1" noAdjustHandles="1" noChangeArrowheads="1" noChangeShapeType="1" noTextEdit="1"/>
-          </p:cNvSpPr>
-          <p:nvPr>
-            <p:extLst>
-              <p:ext uri="{386F3935-93C4-4BCD-93E2-E3B085C9AB24}">
-                <p16:designElem xmlns:p16="http://schemas.microsoft.com/office/powerpoint/2015/main" val="1"/>
-              </p:ext>
-            </p:extLst>
-          </p:nvPr>
-        </p:nvSpPr>
-        <p:spPr bwMode="white">
-          <a:xfrm>
-            <a:off x="0" y="0"/>
-            <a:ext cx="12192000" cy="6858000"/>
-          </a:xfrm>
-          <a:prstGeom prst="rect">
-            <a:avLst/>
-          </a:prstGeom>
-          <a:solidFill>
-            <a:schemeClr val="bg2"/>
-          </a:solidFill>
-          <a:effectLst/>
-        </p:spPr>
-      </p:sp>
-      <p:sp>
-        <p:nvSpPr>
-          <p:cNvPr id="12" name="Rectangle 11" title="Side bar"/>
-          <p:cNvSpPr>
-            <a:spLocks noGrp="1" noRot="1" noChangeAspect="1" noMove="1" noResize="1" noEditPoints="1" noAdjustHandles="1" noChangeArrowheads="1" noChangeShapeType="1" noTextEdit="1"/>
-          </p:cNvSpPr>
-          <p:nvPr>
-            <p:extLst>
-              <p:ext uri="{386F3935-93C4-4BCD-93E2-E3B085C9AB24}">
-                <p16:designElem xmlns:p16="http://schemas.microsoft.com/office/powerpoint/2015/main" val="1"/>
-              </p:ext>
-            </p:extLst>
-          </p:nvPr>
-        </p:nvSpPr>
-        <p:spPr>
-          <a:xfrm>
-            <a:off x="478095" y="376"/>
-            <a:ext cx="228600" cy="6858000"/>
-          </a:xfrm>
-          <a:prstGeom prst="rect">
-            <a:avLst/>
-          </a:prstGeom>
-          <a:solidFill>
-            <a:schemeClr val="tx2"/>
-          </a:solidFill>
-          <a:ln>
-            <a:noFill/>
-          </a:ln>
-        </p:spPr>
-        <p:style>
-          <a:lnRef idx="2">
-            <a:schemeClr val="accent1">
-              <a:shade val="50000"/>
-            </a:schemeClr>
-          </a:lnRef>
-          <a:fillRef idx="1">
-            <a:schemeClr val="accent1"/>
-          </a:fillRef>
-          <a:effectRef idx="0">
-            <a:schemeClr val="accent1"/>
-          </a:effectRef>
-          <a:fontRef idx="minor">
-            <a:schemeClr val="lt1"/>
-          </a:fontRef>
-        </p:style>
-      </p:sp>
-      <p:pic>
-        <p:nvPicPr>
-          <p:cNvPr id="5" name="Content Placeholder 4"/>
-          <p:cNvPicPr>
-            <a:picLocks noGrp="1" noChangeAspect="1"/>
-          </p:cNvPicPr>
-          <p:nvPr>
-            <p:ph sz="half" idx="2"/>
-          </p:nvPr>
-        </p:nvPicPr>
-        <p:blipFill>
-          <a:blip r:embed="rId2">
-            <a:extLst>
-              <a:ext uri="{28A0092B-C50C-407E-A947-70E740481C1C}">
-                <a14:useLocalDpi xmlns:a14="http://schemas.microsoft.com/office/drawing/2010/main" val="0"/>
-              </a:ext>
-            </a:extLst>
-          </a:blip>
-          <a:stretch>
-            <a:fillRect/>
-          </a:stretch>
-        </p:blipFill>
-        <p:spPr>
-          <a:xfrm>
-            <a:off x="4799068" y="4550229"/>
-            <a:ext cx="6682315" cy="1687285"/>
-          </a:xfrm>
-          <a:prstGeom prst="rect">
-            <a:avLst/>
-          </a:prstGeom>
-        </p:spPr>
-      </p:pic>
-      <p:sp>
-        <p:nvSpPr>
-          <p:cNvPr id="14" name="Rectangle 13" title="Side bar"/>
-          <p:cNvSpPr>
-            <a:spLocks noGrp="1" noRot="1" noChangeAspect="1" noMove="1" noResize="1" noEditPoints="1" noAdjustHandles="1" noChangeArrowheads="1" noChangeShapeType="1" noTextEdit="1"/>
-          </p:cNvSpPr>
-          <p:nvPr>
-            <p:extLst>
-              <p:ext uri="{386F3935-93C4-4BCD-93E2-E3B085C9AB24}">
-                <p16:designElem xmlns:p16="http://schemas.microsoft.com/office/powerpoint/2015/main" val="1"/>
-              </p:ext>
-            </p:extLst>
-          </p:nvPr>
-        </p:nvSpPr>
-        <p:spPr>
-          <a:xfrm>
-            <a:off x="478095" y="376"/>
-            <a:ext cx="228600" cy="6858000"/>
-          </a:xfrm>
-          <a:prstGeom prst="rect">
-            <a:avLst/>
-          </a:prstGeom>
-          <a:solidFill>
-            <a:schemeClr val="tx2"/>
-          </a:solidFill>
-          <a:ln>
-            <a:noFill/>
-          </a:ln>
-        </p:spPr>
-        <p:style>
-          <a:lnRef idx="2">
-            <a:schemeClr val="accent1">
-              <a:shade val="50000"/>
-            </a:schemeClr>
-          </a:lnRef>
-          <a:fillRef idx="1">
-            <a:schemeClr val="accent1"/>
-          </a:fillRef>
-          <a:effectRef idx="0">
-            <a:schemeClr val="accent1"/>
-          </a:effectRef>
-          <a:fontRef idx="minor">
-            <a:schemeClr val="lt1"/>
-          </a:fontRef>
-        </p:style>
-      </p:sp>
-      <p:sp>
-        <p:nvSpPr>
-          <p:cNvPr id="2" name="Title 1"/>
-          <p:cNvSpPr>
-            <a:spLocks noGrp="1"/>
-          </p:cNvSpPr>
-          <p:nvPr>
-            <p:ph type="title"/>
-          </p:nvPr>
-        </p:nvSpPr>
-        <p:spPr>
-          <a:xfrm>
-            <a:off x="881744" y="631372"/>
-            <a:ext cx="3135086" cy="5606142"/>
-          </a:xfrm>
-        </p:spPr>
-        <p:txBody>
-          <a:bodyPr vert="horz" lIns="91440" tIns="45720" rIns="91440" bIns="45720" rtlCol="0" anchor="t">
-            <a:normAutofit/>
-          </a:bodyPr>
-          <a:lstStyle/>
-          <a:p>
-            <a:r>
-              <a:rPr lang="en-US" dirty="0"/>
-              <a:t>Saving Outputs</a:t>
-            </a:r>
-          </a:p>
-        </p:txBody>
-      </p:sp>
-      <p:sp>
-        <p:nvSpPr>
-          <p:cNvPr id="3" name="Content Placeholder 2"/>
-          <p:cNvSpPr>
-            <a:spLocks noGrp="1"/>
-          </p:cNvSpPr>
-          <p:nvPr>
-            <p:ph sz="half" idx="1"/>
-          </p:nvPr>
-        </p:nvSpPr>
-        <p:spPr>
-          <a:xfrm>
-            <a:off x="4741595" y="631371"/>
-            <a:ext cx="6797262" cy="3744685"/>
-          </a:xfrm>
-        </p:spPr>
-        <p:txBody>
-          <a:bodyPr vert="horz" lIns="91440" tIns="45720" rIns="91440" bIns="45720" rtlCol="0">
-            <a:normAutofit/>
-          </a:bodyPr>
-          <a:lstStyle/>
-          <a:p>
-            <a:r>
-              <a:rPr lang="en-US" dirty="0"/>
-              <a:t>Output is a list which you build onto as you create your visuals</a:t>
-            </a:r>
-          </a:p>
-          <a:p>
-            <a:r>
-              <a:rPr lang="en-US" dirty="0"/>
-              <a:t>Each entry in the list is called in the UI by the name saved.</a:t>
-            </a:r>
-          </a:p>
-          <a:p>
-            <a:r>
-              <a:rPr lang="en-US" dirty="0"/>
-              <a:t>Example:</a:t>
-            </a:r>
-          </a:p>
-          <a:p>
-            <a:pPr lvl="1"/>
-            <a:r>
-              <a:rPr lang="en-US" dirty="0"/>
-              <a:t>The three outputs below are called by “</a:t>
-            </a:r>
-            <a:r>
-              <a:rPr lang="en-US" dirty="0" err="1"/>
-              <a:t>report.table</a:t>
-            </a:r>
-            <a:r>
-              <a:rPr lang="en-US" dirty="0"/>
-              <a:t>”, “</a:t>
-            </a:r>
-            <a:r>
-              <a:rPr lang="en-US" dirty="0" err="1"/>
-              <a:t>downloadData</a:t>
-            </a:r>
-            <a:r>
-              <a:rPr lang="en-US" dirty="0"/>
-              <a:t>” and “map” respectively.</a:t>
-            </a:r>
-          </a:p>
-          <a:p>
-            <a:r>
-              <a:rPr lang="en-US" dirty="0"/>
-              <a:t>Otherwise these images work just like anything created in an </a:t>
-            </a:r>
-            <a:r>
-              <a:rPr lang="en-US" dirty="0" err="1"/>
-              <a:t>RMarkdown</a:t>
-            </a:r>
-            <a:r>
-              <a:rPr lang="en-US" dirty="0"/>
-              <a:t> document</a:t>
-            </a:r>
-          </a:p>
-          <a:p>
-            <a:endParaRPr lang="en-US" dirty="0"/>
-          </a:p>
-        </p:txBody>
-      </p:sp>
-    </p:spTree>
-    <p:extLst>
-      <p:ext uri="{BB962C8B-B14F-4D97-AF65-F5344CB8AC3E}">
-        <p14:creationId xmlns:p14="http://schemas.microsoft.com/office/powerpoint/2010/main" val="3697256943"/>
-      </p:ext>
-    </p:extLst>
-  </p:cSld>
-  <p:clrMapOvr>
-    <a:masterClrMapping/>
-  </p:clrMapOvr>
-</p:sld>
-</file>
-
-<file path=ppt/slides/slide18.xml><?xml version="1.0" encoding="utf-8"?>
-<p:sld xmlns:a="http://schemas.openxmlformats.org/drawingml/2006/main" xmlns:r="http://schemas.openxmlformats.org/officeDocument/2006/relationships" xmlns:p="http://schemas.openxmlformats.org/presentationml/2006/main">
-  <p:cSld>
-    <p:spTree>
-      <p:nvGrpSpPr>
-        <p:cNvPr id="1" name=""/>
-        <p:cNvGrpSpPr/>
-        <p:nvPr/>
-      </p:nvGrpSpPr>
-      <p:grpSpPr>
-        <a:xfrm>
-          <a:off x="0" y="0"/>
-          <a:ext cx="0" cy="0"/>
-          <a:chOff x="0" y="0"/>
-          <a:chExt cx="0" cy="0"/>
-        </a:xfrm>
-      </p:grpSpPr>
-      <p:sp>
-        <p:nvSpPr>
-          <p:cNvPr id="2" name="Title 1"/>
-          <p:cNvSpPr>
-            <a:spLocks noGrp="1"/>
-          </p:cNvSpPr>
-          <p:nvPr>
-            <p:ph type="title"/>
-          </p:nvPr>
-        </p:nvSpPr>
-        <p:spPr/>
-        <p:txBody>
-          <a:bodyPr/>
-          <a:lstStyle/>
-          <a:p>
-            <a:r>
-              <a:rPr lang="en-US" dirty="0"/>
-              <a:t>The Server Function</a:t>
-            </a:r>
-          </a:p>
-        </p:txBody>
-      </p:sp>
-      <p:sp>
-        <p:nvSpPr>
-          <p:cNvPr id="3" name="Text Placeholder 2"/>
-          <p:cNvSpPr>
-            <a:spLocks noGrp="1"/>
-          </p:cNvSpPr>
-          <p:nvPr>
-            <p:ph type="body" idx="1"/>
-          </p:nvPr>
-        </p:nvSpPr>
-        <p:spPr/>
-        <p:txBody>
-          <a:bodyPr/>
-          <a:lstStyle/>
-          <a:p>
-            <a:endParaRPr lang="en-US" dirty="0"/>
-          </a:p>
-        </p:txBody>
-      </p:sp>
-    </p:spTree>
-    <p:extLst>
-      <p:ext uri="{BB962C8B-B14F-4D97-AF65-F5344CB8AC3E}">
-        <p14:creationId xmlns:p14="http://schemas.microsoft.com/office/powerpoint/2010/main" val="1050279111"/>
-      </p:ext>
-    </p:extLst>
-  </p:cSld>
-  <p:clrMapOvr>
-    <a:masterClrMapping/>
-  </p:clrMapOvr>
-</p:sld>
-</file>
-
-<file path=ppt/slides/slide19.xml><?xml version="1.0" encoding="utf-8"?>
-<p:sld xmlns:a="http://schemas.openxmlformats.org/drawingml/2006/main" xmlns:r="http://schemas.openxmlformats.org/officeDocument/2006/relationships" xmlns:p="http://schemas.openxmlformats.org/presentationml/2006/main">
-  <p:cSld>
-    <p:spTree>
-      <p:nvGrpSpPr>
-        <p:cNvPr id="1" name=""/>
-        <p:cNvGrpSpPr/>
-        <p:nvPr/>
-      </p:nvGrpSpPr>
-      <p:grpSpPr>
-        <a:xfrm>
-          <a:off x="0" y="0"/>
-          <a:ext cx="0" cy="0"/>
-          <a:chOff x="0" y="0"/>
-          <a:chExt cx="0" cy="0"/>
-        </a:xfrm>
-      </p:grpSpPr>
-      <p:sp>
-        <p:nvSpPr>
-          <p:cNvPr id="2" name="Title 1"/>
-          <p:cNvSpPr>
-            <a:spLocks noGrp="1"/>
-          </p:cNvSpPr>
-          <p:nvPr>
-            <p:ph type="title"/>
-          </p:nvPr>
-        </p:nvSpPr>
-        <p:spPr>
-          <a:xfrm>
-            <a:off x="881744" y="631372"/>
-            <a:ext cx="3135086" cy="5606142"/>
-          </a:xfrm>
-        </p:spPr>
-        <p:txBody>
-          <a:bodyPr vert="horz" lIns="91440" tIns="45720" rIns="91440" bIns="45720" rtlCol="0" anchor="t">
-            <a:normAutofit/>
-          </a:bodyPr>
-          <a:lstStyle/>
-          <a:p>
-            <a:r>
-              <a:rPr lang="en-US" dirty="0"/>
-              <a:t>Calling Outputs</a:t>
-            </a:r>
-          </a:p>
-        </p:txBody>
-      </p:sp>
-      <p:sp>
-        <p:nvSpPr>
-          <p:cNvPr id="3" name="Content Placeholder 2"/>
-          <p:cNvSpPr>
-            <a:spLocks noGrp="1"/>
-          </p:cNvSpPr>
-          <p:nvPr>
-            <p:ph sz="half" idx="1"/>
-          </p:nvPr>
-        </p:nvSpPr>
-        <p:spPr>
-          <a:xfrm>
-            <a:off x="4741595" y="631372"/>
-            <a:ext cx="6797262" cy="1926478"/>
-          </a:xfrm>
-        </p:spPr>
-        <p:txBody>
-          <a:bodyPr vert="horz" lIns="91440" tIns="45720" rIns="91440" bIns="45720" rtlCol="0">
-            <a:normAutofit/>
-          </a:bodyPr>
-          <a:lstStyle/>
-          <a:p>
-            <a:r>
-              <a:rPr lang="en-US" dirty="0"/>
-              <a:t>Output is a list which you build onto as you create your visuals</a:t>
-            </a:r>
-          </a:p>
-          <a:p>
-            <a:r>
-              <a:rPr lang="en-US" dirty="0"/>
-              <a:t>Each entry in the list is called in the UI by the name saved.</a:t>
-            </a:r>
-          </a:p>
-        </p:txBody>
-      </p:sp>
-      <p:pic>
-        <p:nvPicPr>
-          <p:cNvPr id="6" name="Picture 5"/>
-          <p:cNvPicPr>
-            <a:picLocks noChangeAspect="1"/>
-          </p:cNvPicPr>
-          <p:nvPr/>
-        </p:nvPicPr>
-        <p:blipFill>
-          <a:blip r:embed="rId2"/>
-          <a:stretch>
-            <a:fillRect/>
-          </a:stretch>
-        </p:blipFill>
-        <p:spPr>
-          <a:xfrm>
-            <a:off x="2712726" y="3964975"/>
-            <a:ext cx="7343775" cy="742950"/>
-          </a:xfrm>
-          <a:prstGeom prst="rect">
-            <a:avLst/>
-          </a:prstGeom>
-        </p:spPr>
-      </p:pic>
-    </p:spTree>
-    <p:extLst>
-      <p:ext uri="{BB962C8B-B14F-4D97-AF65-F5344CB8AC3E}">
-        <p14:creationId xmlns:p14="http://schemas.microsoft.com/office/powerpoint/2010/main" val="3914273472"/>
-      </p:ext>
-    </p:extLst>
-  </p:cSld>
-  <p:clrMapOvr>
-    <a:masterClrMapping/>
-  </p:clrMapOvr>
-</p:sld>
-</file>
-
-<file path=ppt/slides/slide2.xml><?xml version="1.0" encoding="utf-8"?>
-<p:sld xmlns:a="http://schemas.openxmlformats.org/drawingml/2006/main" xmlns:r="http://schemas.openxmlformats.org/officeDocument/2006/relationships" xmlns:p="http://schemas.openxmlformats.org/presentationml/2006/main">
-  <p:cSld>
-    <p:spTree>
-      <p:nvGrpSpPr>
-        <p:cNvPr id="1" name=""/>
-        <p:cNvGrpSpPr/>
-        <p:nvPr/>
-      </p:nvGrpSpPr>
-      <p:grpSpPr>
-        <a:xfrm>
-          <a:off x="0" y="0"/>
-          <a:ext cx="0" cy="0"/>
-          <a:chOff x="0" y="0"/>
-          <a:chExt cx="0" cy="0"/>
-        </a:xfrm>
-      </p:grpSpPr>
-      <p:sp>
-        <p:nvSpPr>
-          <p:cNvPr id="2" name="Title 1"/>
-          <p:cNvSpPr>
-            <a:spLocks noGrp="1"/>
-          </p:cNvSpPr>
-          <p:nvPr>
-            <p:ph type="title"/>
-          </p:nvPr>
-        </p:nvSpPr>
-        <p:spPr/>
-        <p:txBody>
-          <a:bodyPr/>
-          <a:lstStyle/>
-          <a:p>
-            <a:r>
-              <a:rPr lang="en-US" dirty="0"/>
-              <a:t>Basic Concepts of Shiny apps</a:t>
-            </a:r>
-          </a:p>
-        </p:txBody>
-      </p:sp>
-      <p:sp>
-        <p:nvSpPr>
-          <p:cNvPr id="3" name="Text Placeholder 2"/>
-          <p:cNvSpPr>
-            <a:spLocks noGrp="1"/>
-          </p:cNvSpPr>
-          <p:nvPr>
-            <p:ph type="body" idx="1"/>
-          </p:nvPr>
-        </p:nvSpPr>
-        <p:spPr/>
-        <p:txBody>
-          <a:bodyPr/>
-          <a:lstStyle/>
-          <a:p>
-            <a:r>
-              <a:rPr lang="en-US" dirty="0"/>
-              <a:t>They’re all just functions</a:t>
-            </a:r>
-          </a:p>
-        </p:txBody>
-      </p:sp>
-    </p:spTree>
-    <p:extLst>
-      <p:ext uri="{BB962C8B-B14F-4D97-AF65-F5344CB8AC3E}">
-        <p14:creationId xmlns:p14="http://schemas.microsoft.com/office/powerpoint/2010/main" val="1722406127"/>
-      </p:ext>
-    </p:extLst>
-  </p:cSld>
-  <p:clrMapOvr>
-    <a:masterClrMapping/>
-  </p:clrMapOvr>
-</p:sld>
-</file>
-
-<file path=ppt/slides/slide20.xml><?xml version="1.0" encoding="utf-8"?>
-<p:sld xmlns:a="http://schemas.openxmlformats.org/drawingml/2006/main" xmlns:r="http://schemas.openxmlformats.org/officeDocument/2006/relationships" xmlns:p="http://schemas.openxmlformats.org/presentationml/2006/main">
-  <p:cSld>
-    <p:spTree>
-      <p:nvGrpSpPr>
-        <p:cNvPr id="1" name=""/>
-        <p:cNvGrpSpPr/>
-        <p:nvPr/>
-      </p:nvGrpSpPr>
-      <p:grpSpPr>
-        <a:xfrm>
-          <a:off x="0" y="0"/>
-          <a:ext cx="0" cy="0"/>
-          <a:chOff x="0" y="0"/>
-          <a:chExt cx="0" cy="0"/>
-        </a:xfrm>
-      </p:grpSpPr>
-      <p:sp>
-        <p:nvSpPr>
-          <p:cNvPr id="2" name="Title 1"/>
-          <p:cNvSpPr>
-            <a:spLocks noGrp="1"/>
-          </p:cNvSpPr>
-          <p:nvPr>
-            <p:ph type="title"/>
-          </p:nvPr>
-        </p:nvSpPr>
-        <p:spPr/>
-        <p:txBody>
-          <a:bodyPr/>
-          <a:lstStyle/>
-          <a:p>
-            <a:r>
-              <a:rPr lang="en-US" dirty="0"/>
-              <a:t>Server Function</a:t>
-            </a:r>
-          </a:p>
-        </p:txBody>
-      </p:sp>
-      <p:sp>
-        <p:nvSpPr>
-          <p:cNvPr id="3" name="Content Placeholder 2"/>
-          <p:cNvSpPr>
-            <a:spLocks noGrp="1"/>
-          </p:cNvSpPr>
-          <p:nvPr>
-            <p:ph idx="1"/>
-          </p:nvPr>
-        </p:nvSpPr>
-        <p:spPr>
-          <a:xfrm>
-            <a:off x="1371600" y="1528175"/>
-            <a:ext cx="9601200" cy="5173250"/>
-          </a:xfrm>
-        </p:spPr>
-        <p:txBody>
-          <a:bodyPr>
-            <a:normAutofit/>
-          </a:bodyPr>
-          <a:lstStyle/>
-          <a:p>
-            <a:r>
-              <a:rPr lang="en-US" dirty="0"/>
-              <a:t>Outputs</a:t>
-            </a:r>
-          </a:p>
-          <a:p>
-            <a:pPr lvl="1"/>
-            <a:r>
-              <a:rPr lang="en-US" dirty="0"/>
-              <a:t>List of functions called in the UI which generates plots, tables and other objects.</a:t>
-            </a:r>
-          </a:p>
-          <a:p>
-            <a:pPr lvl="1"/>
-            <a:r>
-              <a:rPr lang="en-US" dirty="0"/>
-              <a:t>Will regenerate whenever dependent inputs are changed, or based off of required action in UI.</a:t>
-            </a:r>
-          </a:p>
-          <a:p>
-            <a:pPr lvl="1"/>
-            <a:r>
-              <a:rPr lang="en-US" dirty="0"/>
-              <a:t>Shiny Apps will display from any graphics package including;</a:t>
-            </a:r>
-          </a:p>
-          <a:p>
-            <a:pPr marL="1200150" lvl="2" indent="-285750">
-              <a:buFont typeface="Arial" charset="0"/>
-              <a:buChar char="•"/>
-            </a:pPr>
-            <a:r>
-              <a:rPr lang="en-US" dirty="0"/>
-              <a:t>ggplot2</a:t>
-            </a:r>
-          </a:p>
-          <a:p>
-            <a:pPr marL="1200150" lvl="2" indent="-285750">
-              <a:buFont typeface="Arial" charset="0"/>
-              <a:buChar char="•"/>
-            </a:pPr>
-            <a:r>
-              <a:rPr lang="en-US" dirty="0" err="1"/>
-              <a:t>plotly</a:t>
-            </a:r>
-            <a:endParaRPr lang="en-US" dirty="0"/>
-          </a:p>
-          <a:p>
-            <a:pPr marL="1200150" lvl="2" indent="-285750">
-              <a:buFont typeface="Arial" charset="0"/>
-              <a:buChar char="•"/>
-            </a:pPr>
-            <a:r>
-              <a:rPr lang="en-US" dirty="0"/>
-              <a:t>DT</a:t>
-            </a:r>
-          </a:p>
-          <a:p>
-            <a:pPr marL="1200150" lvl="2" indent="-285750">
-              <a:buFont typeface="Arial" charset="0"/>
-              <a:buChar char="•"/>
-            </a:pPr>
-            <a:r>
-              <a:rPr lang="en-US" dirty="0" err="1"/>
-              <a:t>LeafletR</a:t>
-            </a:r>
-            <a:endParaRPr lang="en-US" dirty="0"/>
-          </a:p>
-          <a:p>
-            <a:pPr marL="1200150" lvl="2" indent="-285750">
-              <a:buFont typeface="Arial" charset="0"/>
-              <a:buChar char="•"/>
-            </a:pPr>
-            <a:r>
-              <a:rPr lang="en-US" dirty="0" err="1"/>
-              <a:t>googleVis</a:t>
-            </a:r>
-            <a:endParaRPr lang="en-US" dirty="0"/>
-          </a:p>
-          <a:p>
-            <a:pPr marL="1200150" lvl="2" indent="-285750">
-              <a:buFont typeface="Arial" charset="0"/>
-              <a:buChar char="•"/>
-            </a:pPr>
-            <a:r>
-              <a:rPr lang="en-US" dirty="0"/>
-              <a:t>wordcloud2</a:t>
-            </a:r>
-          </a:p>
-          <a:p>
-            <a:pPr marL="1200150" lvl="2" indent="-285750">
-              <a:buFont typeface="Arial" charset="0"/>
-              <a:buChar char="•"/>
-            </a:pPr>
-            <a:r>
-              <a:rPr lang="en-US" dirty="0" err="1"/>
-              <a:t>ggmap</a:t>
-            </a:r>
-            <a:endParaRPr lang="en-US" dirty="0"/>
-          </a:p>
-          <a:p>
-            <a:pPr lvl="2"/>
-            <a:endParaRPr lang="en-US" dirty="0"/>
-          </a:p>
-          <a:p>
-            <a:pPr lvl="2"/>
-            <a:endParaRPr lang="en-US" dirty="0"/>
-          </a:p>
-        </p:txBody>
-      </p:sp>
-    </p:spTree>
-    <p:extLst>
-      <p:ext uri="{BB962C8B-B14F-4D97-AF65-F5344CB8AC3E}">
-        <p14:creationId xmlns:p14="http://schemas.microsoft.com/office/powerpoint/2010/main" val="1507377180"/>
-      </p:ext>
-    </p:extLst>
-  </p:cSld>
-  <p:clrMapOvr>
-    <a:masterClrMapping/>
-  </p:clrMapOvr>
-</p:sld>
-</file>
-
-<file path=ppt/slides/slide21.xml><?xml version="1.0" encoding="utf-8"?>
+<file path=ppt/slides/slide23.xml><?xml version="1.0" encoding="utf-8"?>
 <p:sld xmlns:a="http://schemas.openxmlformats.org/drawingml/2006/main" xmlns:r="http://schemas.openxmlformats.org/officeDocument/2006/relationships" xmlns:p="http://schemas.openxmlformats.org/presentationml/2006/main">
   <p:cSld>
     <p:spTree>
@@ -5942,32 +6076,10 @@
       </p:grpSpPr>
       <p:sp>
         <p:nvSpPr>
-          <p:cNvPr id="2" name="Title 1"/>
-          <p:cNvSpPr>
-            <a:spLocks noGrp="1"/>
-          </p:cNvSpPr>
-          <p:nvPr>
-            <p:ph type="title"/>
-          </p:nvPr>
-        </p:nvSpPr>
-        <p:spPr/>
-        <p:txBody>
-          <a:bodyPr/>
-          <a:lstStyle/>
-          <a:p>
-            <a:r>
-              <a:rPr lang="en-US" dirty="0"/>
-              <a:t>Example Apps</a:t>
-            </a:r>
-          </a:p>
-        </p:txBody>
-      </p:sp>
-      <p:sp>
-        <p:nvSpPr>
-          <p:cNvPr id="4" name="Content Placeholder 3">
+          <p:cNvPr id="2" name="Title 1">
             <a:extLst>
               <a:ext uri="{FF2B5EF4-FFF2-40B4-BE49-F238E27FC236}">
-                <a16:creationId xmlns:a16="http://schemas.microsoft.com/office/drawing/2014/main" id="{12D87FA9-E0E2-2D43-86C3-F7E249C1B816}"/>
+                <a16:creationId xmlns:a16="http://schemas.microsoft.com/office/drawing/2014/main" id="{FD6C12C3-8B37-EB44-A4AC-93C3B2E286B5}"/>
               </a:ext>
             </a:extLst>
           </p:cNvPr>
@@ -5975,75 +6087,27 @@
             <a:spLocks noGrp="1"/>
           </p:cNvSpPr>
           <p:nvPr>
-            <p:ph sz="half" idx="1"/>
+            <p:ph type="title"/>
           </p:nvPr>
         </p:nvSpPr>
         <p:spPr/>
         <p:txBody>
-          <a:bodyPr>
-            <a:normAutofit/>
-          </a:bodyPr>
+          <a:bodyPr/>
           <a:lstStyle/>
           <a:p>
             <a:r>
               <a:rPr lang="en-US" dirty="0"/>
-              <a:t>App</a:t>
-            </a:r>
-          </a:p>
-          <a:p>
-            <a:pPr lvl="1"/>
-            <a:r>
-              <a:rPr lang="en-US" dirty="0">
-                <a:hlinkClick r:id="rId2"/>
-              </a:rPr>
-              <a:t>https://gallery.shinyapps.io/lego-viz/</a:t>
-            </a:r>
-            <a:endParaRPr lang="en-US" dirty="0"/>
-          </a:p>
-          <a:p>
-            <a:r>
-              <a:rPr lang="en-US" dirty="0"/>
-              <a:t>Shiny Dashboard</a:t>
-            </a:r>
-          </a:p>
-          <a:p>
-            <a:pPr lvl="1"/>
-            <a:r>
-              <a:rPr lang="en-US" dirty="0">
-                <a:hlinkClick r:id="rId3"/>
-              </a:rPr>
-              <a:t>https://gallery.shinyapps.io/087-crandash/</a:t>
-            </a:r>
-            <a:endParaRPr lang="en-US" dirty="0"/>
-          </a:p>
-          <a:p>
-            <a:r>
-              <a:rPr lang="en-US" dirty="0" err="1"/>
-              <a:t>Flexdashboard</a:t>
-            </a:r>
-            <a:endParaRPr lang="en-US" dirty="0"/>
-          </a:p>
-          <a:p>
-            <a:pPr lvl="1"/>
-            <a:r>
-              <a:rPr lang="en-US" dirty="0">
-                <a:hlinkClick r:id="rId4"/>
-              </a:rPr>
-              <a:t>https://pittsburghpa.shinyapps.io/dashburgh/</a:t>
-            </a:r>
-            <a:r>
-              <a:rPr lang="en-US" dirty="0"/>
-              <a:t>	</a:t>
-            </a:r>
-          </a:p>
-        </p:txBody>
-      </p:sp>
-      <p:sp>
-        <p:nvSpPr>
-          <p:cNvPr id="5" name="Content Placeholder 4">
+              <a:t>Don’t panic!</a:t>
+            </a:r>
+          </a:p>
+        </p:txBody>
+      </p:sp>
+      <p:sp>
+        <p:nvSpPr>
+          <p:cNvPr id="3" name="Content Placeholder 2">
             <a:extLst>
               <a:ext uri="{FF2B5EF4-FFF2-40B4-BE49-F238E27FC236}">
-                <a16:creationId xmlns:a16="http://schemas.microsoft.com/office/drawing/2014/main" id="{BA7E9615-4D57-5D4A-A14E-09EB430AAF91}"/>
+                <a16:creationId xmlns:a16="http://schemas.microsoft.com/office/drawing/2014/main" id="{38F3B319-E51B-5948-A4A8-A12DD7E3FB61}"/>
               </a:ext>
             </a:extLst>
           </p:cNvPr>
@@ -6051,44 +6115,37 @@
             <a:spLocks noGrp="1"/>
           </p:cNvSpPr>
           <p:nvPr>
-            <p:ph sz="half" idx="2"/>
+            <p:ph idx="1"/>
           </p:nvPr>
         </p:nvSpPr>
         <p:spPr/>
         <p:txBody>
-          <a:bodyPr>
-            <a:normAutofit/>
-          </a:bodyPr>
+          <a:bodyPr/>
           <a:lstStyle/>
           <a:p>
             <a:r>
               <a:rPr lang="en-US" dirty="0"/>
-              <a:t>Map:</a:t>
-            </a:r>
-          </a:p>
-          <a:p>
-            <a:pPr lvl="1"/>
-            <a:r>
-              <a:rPr lang="en-US" dirty="0">
-                <a:hlinkClick r:id="rId5"/>
-              </a:rPr>
-              <a:t>https://pittsburghpa.shinyapps.io/BurghsEyeView</a:t>
-            </a:r>
-            <a:endParaRPr lang="en-US" dirty="0"/>
-          </a:p>
-          <a:p>
-            <a:pPr lvl="1"/>
-            <a:endParaRPr lang="en-US" dirty="0"/>
-          </a:p>
-          <a:p>
-            <a:endParaRPr lang="en-US" dirty="0"/>
+              <a:t>GitHub Desktop is PLENTY for this course.</a:t>
+            </a:r>
+          </a:p>
+          <a:p>
+            <a:r>
+              <a:rPr lang="en-US" dirty="0"/>
+              <a:t>R Projects are awesome</a:t>
+            </a:r>
+          </a:p>
+          <a:p>
+            <a:r>
+              <a:rPr lang="en-US" dirty="0"/>
+              <a:t>Git doesn’t need to appear in R Studio for you to use it</a:t>
+            </a:r>
           </a:p>
         </p:txBody>
       </p:sp>
     </p:spTree>
     <p:extLst>
       <p:ext uri="{BB962C8B-B14F-4D97-AF65-F5344CB8AC3E}">
-        <p14:creationId xmlns:p14="http://schemas.microsoft.com/office/powerpoint/2010/main" val="2951900108"/>
+        <p14:creationId xmlns:p14="http://schemas.microsoft.com/office/powerpoint/2010/main" val="262272014"/>
       </p:ext>
     </p:extLst>
   </p:cSld>
@@ -6117,7 +6174,7 @@
       </p:grpSpPr>
       <p:sp>
         <p:nvSpPr>
-          <p:cNvPr id="4" name="Title 3"/>
+          <p:cNvPr id="2" name="Title 1"/>
           <p:cNvSpPr>
             <a:spLocks noGrp="1"/>
           </p:cNvSpPr>
@@ -6132,114 +6189,37 @@
           <a:p>
             <a:r>
               <a:rPr lang="en-US" dirty="0"/>
-              <a:t>Two Basic Parts of the function</a:t>
-            </a:r>
-          </a:p>
-        </p:txBody>
-      </p:sp>
-      <p:sp>
-        <p:nvSpPr>
-          <p:cNvPr id="6" name="Content Placeholder 5"/>
-          <p:cNvSpPr>
-            <a:spLocks noGrp="1"/>
-          </p:cNvSpPr>
-          <p:nvPr>
-            <p:ph sz="half" idx="2"/>
-          </p:nvPr>
-        </p:nvSpPr>
-        <p:spPr>
-          <a:xfrm>
-            <a:off x="1371600" y="2804983"/>
-            <a:ext cx="9601589" cy="3768811"/>
-          </a:xfrm>
-        </p:spPr>
+              <a:t>Basic Concepts of Shiny apps</a:t>
+            </a:r>
+          </a:p>
+        </p:txBody>
+      </p:sp>
+      <p:sp>
+        <p:nvSpPr>
+          <p:cNvPr id="3" name="Text Placeholder 2"/>
+          <p:cNvSpPr>
+            <a:spLocks noGrp="1"/>
+          </p:cNvSpPr>
+          <p:nvPr>
+            <p:ph type="body" idx="1"/>
+          </p:nvPr>
+        </p:nvSpPr>
+        <p:spPr/>
         <p:txBody>
           <a:bodyPr/>
           <a:lstStyle/>
           <a:p>
             <a:r>
-              <a:rPr lang="en-US" b="1" dirty="0"/>
-              <a:t>UI </a:t>
-            </a:r>
-            <a:r>
-              <a:rPr lang="mr-IN" b="1" dirty="0"/>
-              <a:t>–</a:t>
-            </a:r>
-            <a:r>
-              <a:rPr lang="en-US" b="1" dirty="0"/>
-              <a:t> User Interface</a:t>
-            </a:r>
-          </a:p>
-          <a:p>
-            <a:pPr lvl="1"/>
-            <a:r>
-              <a:rPr lang="en-US" dirty="0"/>
-              <a:t>Builds the webpage</a:t>
-            </a:r>
-          </a:p>
-          <a:p>
-            <a:pPr lvl="1"/>
-            <a:r>
-              <a:rPr lang="en-US" dirty="0"/>
-              <a:t>Can be done in R code OR HTML</a:t>
-            </a:r>
-          </a:p>
-          <a:p>
-            <a:r>
-              <a:rPr lang="en-US" b="1" dirty="0"/>
-              <a:t>Server</a:t>
-            </a:r>
-          </a:p>
-          <a:p>
-            <a:pPr lvl="1"/>
-            <a:r>
-              <a:rPr lang="en-US" dirty="0"/>
-              <a:t>Generates all reactive content</a:t>
-            </a:r>
-          </a:p>
-          <a:p>
-            <a:pPr lvl="1"/>
-            <a:r>
-              <a:rPr lang="en-US" dirty="0"/>
-              <a:t>Can be used to change portions of UI</a:t>
-            </a:r>
-          </a:p>
-        </p:txBody>
-      </p:sp>
-      <p:pic>
-        <p:nvPicPr>
-          <p:cNvPr id="3" name="Picture 2"/>
-          <p:cNvPicPr>
-            <a:picLocks noChangeAspect="1"/>
-          </p:cNvPicPr>
-          <p:nvPr/>
-        </p:nvPicPr>
-        <p:blipFill>
-          <a:blip r:embed="rId2">
-            <a:extLst>
-              <a:ext uri="{28A0092B-C50C-407E-A947-70E740481C1C}">
-                <a14:useLocalDpi xmlns:a14="http://schemas.microsoft.com/office/drawing/2010/main" val="0"/>
-              </a:ext>
-            </a:extLst>
-          </a:blip>
-          <a:stretch>
-            <a:fillRect/>
-          </a:stretch>
-        </p:blipFill>
-        <p:spPr>
-          <a:xfrm>
-            <a:off x="6356723" y="3385751"/>
-            <a:ext cx="5562922" cy="704396"/>
-          </a:xfrm>
-          <a:prstGeom prst="rect">
-            <a:avLst/>
-          </a:prstGeom>
-        </p:spPr>
-      </p:pic>
+              <a:rPr lang="en-US" dirty="0"/>
+              <a:t>They’re all just functions</a:t>
+            </a:r>
+          </a:p>
+        </p:txBody>
+      </p:sp>
     </p:spTree>
     <p:extLst>
       <p:ext uri="{BB962C8B-B14F-4D97-AF65-F5344CB8AC3E}">
-        <p14:creationId xmlns:p14="http://schemas.microsoft.com/office/powerpoint/2010/main" val="2790557273"/>
+        <p14:creationId xmlns:p14="http://schemas.microsoft.com/office/powerpoint/2010/main" val="1722406127"/>
       </p:ext>
     </p:extLst>
   </p:cSld>
@@ -6283,37 +6263,138 @@
           <a:p>
             <a:r>
               <a:rPr lang="en-US" dirty="0"/>
-              <a:t>The User Interface</a:t>
-            </a:r>
-          </a:p>
-        </p:txBody>
-      </p:sp>
-      <p:sp>
-        <p:nvSpPr>
-          <p:cNvPr id="3" name="Text Placeholder 2"/>
-          <p:cNvSpPr>
-            <a:spLocks noGrp="1"/>
-          </p:cNvSpPr>
-          <p:nvPr>
-            <p:ph type="body" idx="1"/>
+              <a:t>Example Apps</a:t>
+            </a:r>
+          </a:p>
+        </p:txBody>
+      </p:sp>
+      <p:sp>
+        <p:nvSpPr>
+          <p:cNvPr id="4" name="Content Placeholder 3">
+            <a:extLst>
+              <a:ext uri="{FF2B5EF4-FFF2-40B4-BE49-F238E27FC236}">
+                <a16:creationId xmlns:a16="http://schemas.microsoft.com/office/drawing/2014/main" id="{12D87FA9-E0E2-2D43-86C3-F7E249C1B816}"/>
+              </a:ext>
+            </a:extLst>
+          </p:cNvPr>
+          <p:cNvSpPr>
+            <a:spLocks noGrp="1"/>
+          </p:cNvSpPr>
+          <p:nvPr>
+            <p:ph sz="half" idx="1"/>
           </p:nvPr>
         </p:nvSpPr>
         <p:spPr/>
         <p:txBody>
-          <a:bodyPr/>
+          <a:bodyPr>
+            <a:normAutofit/>
+          </a:bodyPr>
           <a:lstStyle/>
           <a:p>
             <a:r>
               <a:rPr lang="en-US" dirty="0"/>
-              <a:t>UI</a:t>
-            </a:r>
+              <a:t>App</a:t>
+            </a:r>
+          </a:p>
+          <a:p>
+            <a:pPr lvl="1"/>
+            <a:r>
+              <a:rPr lang="en-US" dirty="0">
+                <a:hlinkClick r:id="rId2"/>
+              </a:rPr>
+              <a:t>https://gallery.shinyapps.io/lego-viz/</a:t>
+            </a:r>
+            <a:endParaRPr lang="en-US" dirty="0"/>
+          </a:p>
+          <a:p>
+            <a:r>
+              <a:rPr lang="en-US" dirty="0"/>
+              <a:t>Shiny Dashboard</a:t>
+            </a:r>
+          </a:p>
+          <a:p>
+            <a:pPr lvl="1"/>
+            <a:r>
+              <a:rPr lang="en-US" dirty="0">
+                <a:hlinkClick r:id="rId3"/>
+              </a:rPr>
+              <a:t>https://gallery.shinyapps.io/087-crandash/</a:t>
+            </a:r>
+            <a:endParaRPr lang="en-US" dirty="0"/>
+          </a:p>
+          <a:p>
+            <a:r>
+              <a:rPr lang="en-US" dirty="0" err="1"/>
+              <a:t>Flexdashboard</a:t>
+            </a:r>
+            <a:endParaRPr lang="en-US" dirty="0"/>
+          </a:p>
+          <a:p>
+            <a:pPr lvl="1"/>
+            <a:r>
+              <a:rPr lang="en-US" dirty="0">
+                <a:hlinkClick r:id="rId4"/>
+              </a:rPr>
+              <a:t>https://pittsburghpa.shinyapps.io/dashburgh/</a:t>
+            </a:r>
+            <a:r>
+              <a:rPr lang="en-US" dirty="0"/>
+              <a:t>	</a:t>
+            </a:r>
+          </a:p>
+        </p:txBody>
+      </p:sp>
+      <p:sp>
+        <p:nvSpPr>
+          <p:cNvPr id="5" name="Content Placeholder 4">
+            <a:extLst>
+              <a:ext uri="{FF2B5EF4-FFF2-40B4-BE49-F238E27FC236}">
+                <a16:creationId xmlns:a16="http://schemas.microsoft.com/office/drawing/2014/main" id="{BA7E9615-4D57-5D4A-A14E-09EB430AAF91}"/>
+              </a:ext>
+            </a:extLst>
+          </p:cNvPr>
+          <p:cNvSpPr>
+            <a:spLocks noGrp="1"/>
+          </p:cNvSpPr>
+          <p:nvPr>
+            <p:ph sz="half" idx="2"/>
+          </p:nvPr>
+        </p:nvSpPr>
+        <p:spPr/>
+        <p:txBody>
+          <a:bodyPr>
+            <a:normAutofit/>
+          </a:bodyPr>
+          <a:lstStyle/>
+          <a:p>
+            <a:r>
+              <a:rPr lang="en-US" dirty="0"/>
+              <a:t>Map:</a:t>
+            </a:r>
+          </a:p>
+          <a:p>
+            <a:pPr lvl="1"/>
+            <a:r>
+              <a:rPr lang="en-US" dirty="0">
+                <a:hlinkClick r:id="rId5"/>
+              </a:rPr>
+              <a:t>https://shiny.rstudio.com/gallery/superzip-example.html</a:t>
+            </a:r>
+            <a:endParaRPr lang="en-US" dirty="0"/>
+          </a:p>
+          <a:p>
+            <a:pPr lvl="1"/>
+            <a:endParaRPr lang="en-US" dirty="0"/>
+          </a:p>
+          <a:p>
+            <a:endParaRPr lang="en-US" dirty="0"/>
           </a:p>
         </p:txBody>
       </p:sp>
     </p:spTree>
     <p:extLst>
       <p:ext uri="{BB962C8B-B14F-4D97-AF65-F5344CB8AC3E}">
-        <p14:creationId xmlns:p14="http://schemas.microsoft.com/office/powerpoint/2010/main" val="2286111061"/>
+        <p14:creationId xmlns:p14="http://schemas.microsoft.com/office/powerpoint/2010/main" val="2951900108"/>
       </p:ext>
     </p:extLst>
   </p:cSld>
@@ -6342,7 +6423,7 @@
       </p:grpSpPr>
       <p:sp>
         <p:nvSpPr>
-          <p:cNvPr id="2" name="Title 1"/>
+          <p:cNvPr id="4" name="Title 3"/>
           <p:cNvSpPr>
             <a:spLocks noGrp="1"/>
           </p:cNvSpPr>
@@ -6357,20 +6438,87 @@
           <a:p>
             <a:r>
               <a:rPr lang="en-US" dirty="0"/>
-              <a:t>Sidebar Layout</a:t>
+              <a:t>Two Basic Parts of the function</a:t>
+            </a:r>
+          </a:p>
+        </p:txBody>
+      </p:sp>
+      <p:sp>
+        <p:nvSpPr>
+          <p:cNvPr id="6" name="Content Placeholder 5"/>
+          <p:cNvSpPr>
+            <a:spLocks noGrp="1"/>
+          </p:cNvSpPr>
+          <p:nvPr>
+            <p:ph sz="half" idx="2"/>
+          </p:nvPr>
+        </p:nvSpPr>
+        <p:spPr>
+          <a:xfrm>
+            <a:off x="1371600" y="2804983"/>
+            <a:ext cx="9601589" cy="3768811"/>
+          </a:xfrm>
+        </p:spPr>
+        <p:txBody>
+          <a:bodyPr/>
+          <a:lstStyle/>
+          <a:p>
+            <a:r>
+              <a:rPr lang="en-US" b="1" dirty="0"/>
+              <a:t>UI </a:t>
+            </a:r>
+            <a:r>
+              <a:rPr lang="mr-IN" b="1" dirty="0"/>
+              <a:t>–</a:t>
+            </a:r>
+            <a:r>
+              <a:rPr lang="en-US" b="1" dirty="0"/>
+              <a:t> User Interface</a:t>
+            </a:r>
+          </a:p>
+          <a:p>
+            <a:pPr lvl="1"/>
+            <a:r>
+              <a:rPr lang="en-US" dirty="0"/>
+              <a:t>Builds the webpage</a:t>
+            </a:r>
+          </a:p>
+          <a:p>
+            <a:pPr lvl="1"/>
+            <a:r>
+              <a:rPr lang="en-US" dirty="0"/>
+              <a:t>Can be done in R code OR HTML</a:t>
+            </a:r>
+          </a:p>
+          <a:p>
+            <a:r>
+              <a:rPr lang="en-US" b="1" dirty="0"/>
+              <a:t>Server</a:t>
+            </a:r>
+          </a:p>
+          <a:p>
+            <a:pPr lvl="1"/>
+            <a:r>
+              <a:rPr lang="en-US" dirty="0"/>
+              <a:t>Generates all reactive content</a:t>
+            </a:r>
+          </a:p>
+          <a:p>
+            <a:pPr lvl="1"/>
+            <a:r>
+              <a:rPr lang="en-US" dirty="0"/>
+              <a:t>Can be used to change portions of UI</a:t>
             </a:r>
           </a:p>
         </p:txBody>
       </p:sp>
       <p:pic>
         <p:nvPicPr>
-          <p:cNvPr id="5" name="Content Placeholder 4"/>
+          <p:cNvPr id="3" name="Picture 2"/>
           <p:cNvPicPr>
-            <a:picLocks noGrp="1" noChangeAspect="1"/>
+            <a:picLocks noChangeAspect="1"/>
           </p:cNvPicPr>
-          <p:nvPr>
-            <p:ph idx="1"/>
-          </p:nvPr>
+          <p:nvPr/>
         </p:nvPicPr>
         <p:blipFill>
           <a:blip r:embed="rId2">
@@ -6386,15 +6534,18 @@
         </p:blipFill>
         <p:spPr>
           <a:xfrm>
-            <a:off x="1267085" y="1557866"/>
-            <a:ext cx="9810229" cy="5147733"/>
-          </a:xfrm>
+            <a:off x="6356723" y="3385751"/>
+            <a:ext cx="5562922" cy="704396"/>
+          </a:xfrm>
+          <a:prstGeom prst="rect">
+            <a:avLst/>
+          </a:prstGeom>
         </p:spPr>
       </p:pic>
     </p:spTree>
     <p:extLst>
       <p:ext uri="{BB962C8B-B14F-4D97-AF65-F5344CB8AC3E}">
-        <p14:creationId xmlns:p14="http://schemas.microsoft.com/office/powerpoint/2010/main" val="1821191587"/>
+        <p14:creationId xmlns:p14="http://schemas.microsoft.com/office/powerpoint/2010/main" val="2790557273"/>
       </p:ext>
     </p:extLst>
   </p:cSld>
@@ -6421,36 +6572,54 @@
           <a:chExt cx="0" cy="0"/>
         </a:xfrm>
       </p:grpSpPr>
-      <p:pic>
-        <p:nvPicPr>
-          <p:cNvPr id="4" name="Content Placeholder 3"/>
-          <p:cNvPicPr>
-            <a:picLocks noGrp="1" noChangeAspect="1"/>
-          </p:cNvPicPr>
-          <p:nvPr>
-            <p:ph idx="1"/>
-          </p:nvPr>
-        </p:nvPicPr>
-        <p:blipFill>
-          <a:blip r:embed="rId2"/>
-          <a:stretch>
-            <a:fillRect/>
-          </a:stretch>
-        </p:blipFill>
-        <p:spPr>
-          <a:xfrm>
-            <a:off x="482598" y="606412"/>
-            <a:ext cx="10264697" cy="4885766"/>
-          </a:xfrm>
-          <a:prstGeom prst="rect">
-            <a:avLst/>
-          </a:prstGeom>
-        </p:spPr>
-      </p:pic>
+      <p:sp>
+        <p:nvSpPr>
+          <p:cNvPr id="2" name="Title 1"/>
+          <p:cNvSpPr>
+            <a:spLocks noGrp="1"/>
+          </p:cNvSpPr>
+          <p:nvPr>
+            <p:ph type="title"/>
+          </p:nvPr>
+        </p:nvSpPr>
+        <p:spPr/>
+        <p:txBody>
+          <a:bodyPr/>
+          <a:lstStyle/>
+          <a:p>
+            <a:r>
+              <a:rPr lang="en-US" dirty="0"/>
+              <a:t>The User Interface</a:t>
+            </a:r>
+          </a:p>
+        </p:txBody>
+      </p:sp>
+      <p:sp>
+        <p:nvSpPr>
+          <p:cNvPr id="3" name="Text Placeholder 2"/>
+          <p:cNvSpPr>
+            <a:spLocks noGrp="1"/>
+          </p:cNvSpPr>
+          <p:nvPr>
+            <p:ph type="body" idx="1"/>
+          </p:nvPr>
+        </p:nvSpPr>
+        <p:spPr/>
+        <p:txBody>
+          <a:bodyPr/>
+          <a:lstStyle/>
+          <a:p>
+            <a:r>
+              <a:rPr lang="en-US" dirty="0"/>
+              <a:t>UI</a:t>
+            </a:r>
+          </a:p>
+        </p:txBody>
+      </p:sp>
     </p:spTree>
     <p:extLst>
       <p:ext uri="{BB962C8B-B14F-4D97-AF65-F5344CB8AC3E}">
-        <p14:creationId xmlns:p14="http://schemas.microsoft.com/office/powerpoint/2010/main" val="3604545787"/>
+        <p14:creationId xmlns:p14="http://schemas.microsoft.com/office/powerpoint/2010/main" val="2286111061"/>
       </p:ext>
     </p:extLst>
   </p:cSld>
@@ -6494,13 +6663,8 @@
           <a:p>
             <a:r>
               <a:rPr lang="en-US" dirty="0"/>
-              <a:t>Sidebar w/ </a:t>
-            </a:r>
-            <a:r>
-              <a:rPr lang="en-US" dirty="0" err="1"/>
-              <a:t>Tabset</a:t>
-            </a:r>
-            <a:endParaRPr lang="en-US" dirty="0"/>
+              <a:t>Sidebar Layout</a:t>
+            </a:r>
           </a:p>
         </p:txBody>
       </p:sp>
@@ -6528,15 +6692,15 @@
         </p:blipFill>
         <p:spPr>
           <a:xfrm>
-            <a:off x="1586575" y="1557866"/>
-            <a:ext cx="9171248" cy="5147733"/>
+            <a:off x="1267085" y="1557866"/>
+            <a:ext cx="9810229" cy="5147733"/>
           </a:xfrm>
         </p:spPr>
       </p:pic>
     </p:spTree>
     <p:extLst>
       <p:ext uri="{BB962C8B-B14F-4D97-AF65-F5344CB8AC3E}">
-        <p14:creationId xmlns:p14="http://schemas.microsoft.com/office/powerpoint/2010/main" val="2908924918"/>
+        <p14:creationId xmlns:p14="http://schemas.microsoft.com/office/powerpoint/2010/main" val="1821191587"/>
       </p:ext>
     </p:extLst>
   </p:cSld>
@@ -6581,8 +6745,8 @@
         </p:blipFill>
         <p:spPr>
           <a:xfrm>
-            <a:off x="801631" y="508783"/>
-            <a:ext cx="9626630" cy="5081025"/>
+            <a:off x="482598" y="606412"/>
+            <a:ext cx="10264697" cy="4885766"/>
           </a:xfrm>
           <a:prstGeom prst="rect">
             <a:avLst/>
@@ -6592,7 +6756,7 @@
     </p:spTree>
     <p:extLst>
       <p:ext uri="{BB962C8B-B14F-4D97-AF65-F5344CB8AC3E}">
-        <p14:creationId xmlns:p14="http://schemas.microsoft.com/office/powerpoint/2010/main" val="669670436"/>
+        <p14:creationId xmlns:p14="http://schemas.microsoft.com/office/powerpoint/2010/main" val="3604545787"/>
       </p:ext>
     </p:extLst>
   </p:cSld>

</xml_diff>